<commit_message>
merged final inputs and added first and last summary slide
</commit_message>
<xml_diff>
--- a/122/NEMOPS/IAB NEMOPS - YANG-Push - Agile Incremental Driven Development.pptx
+++ b/122/NEMOPS/IAB NEMOPS - YANG-Push - Agile Incremental Driven Development.pptx
@@ -5,17 +5,19 @@
     <p:sldMasterId id="2147483648" r:id="rId1"/>
   </p:sldMasterIdLst>
   <p:notesMasterIdLst>
-    <p:notesMasterId r:id="rId10"/>
+    <p:notesMasterId r:id="rId12"/>
   </p:notesMasterIdLst>
   <p:sldIdLst>
-    <p:sldId id="2145706280" r:id="rId2"/>
-    <p:sldId id="26422" r:id="rId3"/>
-    <p:sldId id="2145706236" r:id="rId4"/>
-    <p:sldId id="2145706275" r:id="rId5"/>
-    <p:sldId id="2145706277" r:id="rId6"/>
-    <p:sldId id="2145706278" r:id="rId7"/>
-    <p:sldId id="2145706279" r:id="rId8"/>
-    <p:sldId id="2145706272" r:id="rId9"/>
+    <p:sldId id="1041" r:id="rId2"/>
+    <p:sldId id="2145706280" r:id="rId3"/>
+    <p:sldId id="26422" r:id="rId4"/>
+    <p:sldId id="2145706236" r:id="rId5"/>
+    <p:sldId id="2145706275" r:id="rId6"/>
+    <p:sldId id="2145706277" r:id="rId7"/>
+    <p:sldId id="2145706278" r:id="rId8"/>
+    <p:sldId id="2145706279" r:id="rId9"/>
+    <p:sldId id="2145706281" r:id="rId10"/>
+    <p:sldId id="2145706272" r:id="rId11"/>
   </p:sldIdLst>
   <p:sldSz cx="12192000" cy="6858000"/>
   <p:notesSz cx="6858000" cy="9144000"/>
@@ -122,21 +124,60 @@
 </p:presentation>
 </file>
 
+<file path=ppt/revisionInfo.xml><?xml version="1.0" encoding="utf-8"?>
+<p1510:revInfo xmlns:a="http://schemas.openxmlformats.org/drawingml/2006/main" xmlns:r="http://schemas.openxmlformats.org/officeDocument/2006/relationships" xmlns:p1510="http://schemas.microsoft.com/office/powerpoint/2015/10/main">
+  <p1510:revLst>
+    <p1510:client id="{43074B02-ABBA-4EEC-B56D-658988DD2B14}" v="3" dt="2024-11-29T10:42:32.893"/>
+  </p1510:revLst>
+</p1510:revInfo>
+</file>
+
 <file path=ppt/changesInfos/changesInfo1.xml><?xml version="1.0" encoding="utf-8"?>
 <pc:chgInfo xmlns:a="http://schemas.openxmlformats.org/drawingml/2006/main" xmlns:r="http://schemas.openxmlformats.org/officeDocument/2006/relationships" xmlns:ac="http://schemas.microsoft.com/office/drawing/2013/main/command" xmlns:pc="http://schemas.microsoft.com/office/powerpoint/2013/main/command">
   <pc:docChgLst>
     <pc:chgData name="Graf Thomas, INI-NET-VNC-HCS" userId="487bc3e3-9ce7-4cdd-b7b4-8899ea88d289" providerId="ADAL" clId="{43074B02-ABBA-4EEC-B56D-658988DD2B14}"/>
-    <pc:docChg chg="modSld">
-      <pc:chgData name="Graf Thomas, INI-NET-VNC-HCS" userId="487bc3e3-9ce7-4cdd-b7b4-8899ea88d289" providerId="ADAL" clId="{43074B02-ABBA-4EEC-B56D-658988DD2B14}" dt="2024-11-27T05:40:27.527" v="35" actId="207"/>
+    <pc:docChg chg="undo custSel addSld modSld">
+      <pc:chgData name="Graf Thomas, INI-NET-VNC-HCS" userId="487bc3e3-9ce7-4cdd-b7b4-8899ea88d289" providerId="ADAL" clId="{43074B02-ABBA-4EEC-B56D-658988DD2B14}" dt="2024-11-29T10:51:57.605" v="500" actId="20577"/>
       <pc:docMkLst>
         <pc:docMk/>
       </pc:docMkLst>
+      <pc:sldChg chg="delSp modSp add mod">
+        <pc:chgData name="Graf Thomas, INI-NET-VNC-HCS" userId="487bc3e3-9ce7-4cdd-b7b4-8899ea88d289" providerId="ADAL" clId="{43074B02-ABBA-4EEC-B56D-658988DD2B14}" dt="2024-11-29T10:45:46.366" v="435" actId="207"/>
+        <pc:sldMkLst>
+          <pc:docMk/>
+          <pc:sldMk cId="3578665336" sldId="1041"/>
+        </pc:sldMkLst>
+        <pc:spChg chg="mod">
+          <ac:chgData name="Graf Thomas, INI-NET-VNC-HCS" userId="487bc3e3-9ce7-4cdd-b7b4-8899ea88d289" providerId="ADAL" clId="{43074B02-ABBA-4EEC-B56D-658988DD2B14}" dt="2024-11-29T10:45:46.366" v="435" actId="207"/>
+          <ac:spMkLst>
+            <pc:docMk/>
+            <pc:sldMk cId="3578665336" sldId="1041"/>
+            <ac:spMk id="5" creationId="{C26208B2-0D10-4C23-B2DE-372A62E98644}"/>
+          </ac:spMkLst>
+        </pc:spChg>
+        <pc:spChg chg="del">
+          <ac:chgData name="Graf Thomas, INI-NET-VNC-HCS" userId="487bc3e3-9ce7-4cdd-b7b4-8899ea88d289" providerId="ADAL" clId="{43074B02-ABBA-4EEC-B56D-658988DD2B14}" dt="2024-11-29T10:42:39.372" v="406" actId="478"/>
+          <ac:spMkLst>
+            <pc:docMk/>
+            <pc:sldMk cId="3578665336" sldId="1041"/>
+            <ac:spMk id="6" creationId="{6CAA0765-1318-4A03-8F91-D3ECC43D8FA7}"/>
+          </ac:spMkLst>
+        </pc:spChg>
+      </pc:sldChg>
       <pc:sldChg chg="modSp mod">
-        <pc:chgData name="Graf Thomas, INI-NET-VNC-HCS" userId="487bc3e3-9ce7-4cdd-b7b4-8899ea88d289" providerId="ADAL" clId="{43074B02-ABBA-4EEC-B56D-658988DD2B14}" dt="2024-11-27T05:36:21.327" v="21" actId="20577"/>
+        <pc:chgData name="Graf Thomas, INI-NET-VNC-HCS" userId="487bc3e3-9ce7-4cdd-b7b4-8899ea88d289" providerId="ADAL" clId="{43074B02-ABBA-4EEC-B56D-658988DD2B14}" dt="2024-11-29T10:14:57.779" v="38" actId="207"/>
         <pc:sldMkLst>
           <pc:docMk/>
           <pc:sldMk cId="1875627337" sldId="2145706277"/>
         </pc:sldMkLst>
+        <pc:spChg chg="mod">
+          <ac:chgData name="Graf Thomas, INI-NET-VNC-HCS" userId="487bc3e3-9ce7-4cdd-b7b4-8899ea88d289" providerId="ADAL" clId="{43074B02-ABBA-4EEC-B56D-658988DD2B14}" dt="2024-11-29T10:14:57.779" v="38" actId="207"/>
+          <ac:spMkLst>
+            <pc:docMk/>
+            <pc:sldMk cId="1875627337" sldId="2145706277"/>
+            <ac:spMk id="3" creationId="{6D8BC07C-4C4B-FF48-3006-FA62102047A3}"/>
+          </ac:spMkLst>
+        </pc:spChg>
         <pc:spChg chg="mod">
           <ac:chgData name="Graf Thomas, INI-NET-VNC-HCS" userId="487bc3e3-9ce7-4cdd-b7b4-8899ea88d289" providerId="ADAL" clId="{43074B02-ABBA-4EEC-B56D-658988DD2B14}" dt="2024-11-27T05:36:21.327" v="21" actId="20577"/>
           <ac:spMkLst>
@@ -147,7 +188,7 @@
         </pc:spChg>
       </pc:sldChg>
       <pc:sldChg chg="modSp mod">
-        <pc:chgData name="Graf Thomas, INI-NET-VNC-HCS" userId="487bc3e3-9ce7-4cdd-b7b4-8899ea88d289" providerId="ADAL" clId="{43074B02-ABBA-4EEC-B56D-658988DD2B14}" dt="2024-11-27T05:38:40.215" v="31" actId="1076"/>
+        <pc:chgData name="Graf Thomas, INI-NET-VNC-HCS" userId="487bc3e3-9ce7-4cdd-b7b4-8899ea88d289" providerId="ADAL" clId="{43074B02-ABBA-4EEC-B56D-658988DD2B14}" dt="2024-11-29T10:41:42.038" v="404" actId="1076"/>
         <pc:sldMkLst>
           <pc:docMk/>
           <pc:sldMk cId="2764131050" sldId="2145706278"/>
@@ -169,7 +210,7 @@
           </ac:spMkLst>
         </pc:spChg>
         <pc:spChg chg="mod">
-          <ac:chgData name="Graf Thomas, INI-NET-VNC-HCS" userId="487bc3e3-9ce7-4cdd-b7b4-8899ea88d289" providerId="ADAL" clId="{43074B02-ABBA-4EEC-B56D-658988DD2B14}" dt="2024-11-27T05:37:32.782" v="28" actId="790"/>
+          <ac:chgData name="Graf Thomas, INI-NET-VNC-HCS" userId="487bc3e3-9ce7-4cdd-b7b4-8899ea88d289" providerId="ADAL" clId="{43074B02-ABBA-4EEC-B56D-658988DD2B14}" dt="2024-11-29T10:40:23.190" v="364" actId="255"/>
           <ac:spMkLst>
             <pc:docMk/>
             <pc:sldMk cId="2764131050" sldId="2145706278"/>
@@ -185,7 +226,7 @@
           </ac:spMkLst>
         </pc:spChg>
         <pc:spChg chg="mod">
-          <ac:chgData name="Graf Thomas, INI-NET-VNC-HCS" userId="487bc3e3-9ce7-4cdd-b7b4-8899ea88d289" providerId="ADAL" clId="{43074B02-ABBA-4EEC-B56D-658988DD2B14}" dt="2024-11-27T05:37:32.782" v="28" actId="790"/>
+          <ac:chgData name="Graf Thomas, INI-NET-VNC-HCS" userId="487bc3e3-9ce7-4cdd-b7b4-8899ea88d289" providerId="ADAL" clId="{43074B02-ABBA-4EEC-B56D-658988DD2B14}" dt="2024-11-29T10:40:36.172" v="366" actId="255"/>
           <ac:spMkLst>
             <pc:docMk/>
             <pc:sldMk cId="2764131050" sldId="2145706278"/>
@@ -209,7 +250,7 @@
           </ac:spMkLst>
         </pc:spChg>
         <pc:spChg chg="mod">
-          <ac:chgData name="Graf Thomas, INI-NET-VNC-HCS" userId="487bc3e3-9ce7-4cdd-b7b4-8899ea88d289" providerId="ADAL" clId="{43074B02-ABBA-4EEC-B56D-658988DD2B14}" dt="2024-11-27T05:37:32.782" v="28" actId="790"/>
+          <ac:chgData name="Graf Thomas, INI-NET-VNC-HCS" userId="487bc3e3-9ce7-4cdd-b7b4-8899ea88d289" providerId="ADAL" clId="{43074B02-ABBA-4EEC-B56D-658988DD2B14}" dt="2024-11-29T10:40:41.085" v="367" actId="255"/>
           <ac:spMkLst>
             <pc:docMk/>
             <pc:sldMk cId="2764131050" sldId="2145706278"/>
@@ -225,7 +266,7 @@
           </ac:spMkLst>
         </pc:spChg>
         <pc:spChg chg="mod">
-          <ac:chgData name="Graf Thomas, INI-NET-VNC-HCS" userId="487bc3e3-9ce7-4cdd-b7b4-8899ea88d289" providerId="ADAL" clId="{43074B02-ABBA-4EEC-B56D-658988DD2B14}" dt="2024-11-27T05:37:32.782" v="28" actId="790"/>
+          <ac:chgData name="Graf Thomas, INI-NET-VNC-HCS" userId="487bc3e3-9ce7-4cdd-b7b4-8899ea88d289" providerId="ADAL" clId="{43074B02-ABBA-4EEC-B56D-658988DD2B14}" dt="2024-11-29T10:40:47.632" v="368" actId="255"/>
           <ac:spMkLst>
             <pc:docMk/>
             <pc:sldMk cId="2764131050" sldId="2145706278"/>
@@ -241,7 +282,7 @@
           </ac:spMkLst>
         </pc:spChg>
         <pc:spChg chg="mod">
-          <ac:chgData name="Graf Thomas, INI-NET-VNC-HCS" userId="487bc3e3-9ce7-4cdd-b7b4-8899ea88d289" providerId="ADAL" clId="{43074B02-ABBA-4EEC-B56D-658988DD2B14}" dt="2024-11-27T05:37:32.782" v="28" actId="790"/>
+          <ac:chgData name="Graf Thomas, INI-NET-VNC-HCS" userId="487bc3e3-9ce7-4cdd-b7b4-8899ea88d289" providerId="ADAL" clId="{43074B02-ABBA-4EEC-B56D-658988DD2B14}" dt="2024-11-29T10:40:53.959" v="369" actId="255"/>
           <ac:spMkLst>
             <pc:docMk/>
             <pc:sldMk cId="2764131050" sldId="2145706278"/>
@@ -257,7 +298,7 @@
           </ac:spMkLst>
         </pc:spChg>
         <pc:spChg chg="mod">
-          <ac:chgData name="Graf Thomas, INI-NET-VNC-HCS" userId="487bc3e3-9ce7-4cdd-b7b4-8899ea88d289" providerId="ADAL" clId="{43074B02-ABBA-4EEC-B56D-658988DD2B14}" dt="2024-11-27T05:37:32.782" v="28" actId="790"/>
+          <ac:chgData name="Graf Thomas, INI-NET-VNC-HCS" userId="487bc3e3-9ce7-4cdd-b7b4-8899ea88d289" providerId="ADAL" clId="{43074B02-ABBA-4EEC-B56D-658988DD2B14}" dt="2024-11-29T10:40:58.557" v="370" actId="255"/>
           <ac:spMkLst>
             <pc:docMk/>
             <pc:sldMk cId="2764131050" sldId="2145706278"/>
@@ -273,15 +314,39 @@
           </ac:spMkLst>
         </pc:spChg>
         <pc:spChg chg="mod">
-          <ac:chgData name="Graf Thomas, INI-NET-VNC-HCS" userId="487bc3e3-9ce7-4cdd-b7b4-8899ea88d289" providerId="ADAL" clId="{43074B02-ABBA-4EEC-B56D-658988DD2B14}" dt="2024-11-27T05:37:32.782" v="28" actId="790"/>
+          <ac:chgData name="Graf Thomas, INI-NET-VNC-HCS" userId="487bc3e3-9ce7-4cdd-b7b4-8899ea88d289" providerId="ADAL" clId="{43074B02-ABBA-4EEC-B56D-658988DD2B14}" dt="2024-11-29T10:40:29.655" v="365" actId="255"/>
           <ac:spMkLst>
             <pc:docMk/>
             <pc:sldMk cId="2764131050" sldId="2145706278"/>
             <ac:spMk id="62" creationId="{9D3C1E24-9BDF-AF99-075F-4F734EBA2636}"/>
           </ac:spMkLst>
         </pc:spChg>
+        <pc:grpChg chg="mod">
+          <ac:chgData name="Graf Thomas, INI-NET-VNC-HCS" userId="487bc3e3-9ce7-4cdd-b7b4-8899ea88d289" providerId="ADAL" clId="{43074B02-ABBA-4EEC-B56D-658988DD2B14}" dt="2024-11-29T10:41:16.856" v="388" actId="1038"/>
+          <ac:grpSpMkLst>
+            <pc:docMk/>
+            <pc:sldMk cId="2764131050" sldId="2145706278"/>
+            <ac:grpSpMk id="8" creationId="{0A1791C6-7957-841E-21E6-B4013FF8AB08}"/>
+          </ac:grpSpMkLst>
+        </pc:grpChg>
+        <pc:grpChg chg="mod">
+          <ac:chgData name="Graf Thomas, INI-NET-VNC-HCS" userId="487bc3e3-9ce7-4cdd-b7b4-8899ea88d289" providerId="ADAL" clId="{43074B02-ABBA-4EEC-B56D-658988DD2B14}" dt="2024-11-29T10:41:16.856" v="388" actId="1038"/>
+          <ac:grpSpMkLst>
+            <pc:docMk/>
+            <pc:sldMk cId="2764131050" sldId="2145706278"/>
+            <ac:grpSpMk id="15" creationId="{3871D3D0-1587-CF69-BABE-481B8DE9F670}"/>
+          </ac:grpSpMkLst>
+        </pc:grpChg>
+        <pc:grpChg chg="mod">
+          <ac:chgData name="Graf Thomas, INI-NET-VNC-HCS" userId="487bc3e3-9ce7-4cdd-b7b4-8899ea88d289" providerId="ADAL" clId="{43074B02-ABBA-4EEC-B56D-658988DD2B14}" dt="2024-11-29T10:41:16.856" v="388" actId="1038"/>
+          <ac:grpSpMkLst>
+            <pc:docMk/>
+            <pc:sldMk cId="2764131050" sldId="2145706278"/>
+            <ac:grpSpMk id="59" creationId="{A4F54A95-D7DF-C891-C7FF-8E228A7013F2}"/>
+          </ac:grpSpMkLst>
+        </pc:grpChg>
         <pc:cxnChg chg="mod">
-          <ac:chgData name="Graf Thomas, INI-NET-VNC-HCS" userId="487bc3e3-9ce7-4cdd-b7b4-8899ea88d289" providerId="ADAL" clId="{43074B02-ABBA-4EEC-B56D-658988DD2B14}" dt="2024-11-27T05:38:40.215" v="31" actId="1076"/>
+          <ac:chgData name="Graf Thomas, INI-NET-VNC-HCS" userId="487bc3e3-9ce7-4cdd-b7b4-8899ea88d289" providerId="ADAL" clId="{43074B02-ABBA-4EEC-B56D-658988DD2B14}" dt="2024-11-29T10:41:39.125" v="402" actId="1076"/>
           <ac:cxnSpMkLst>
             <pc:docMk/>
             <pc:sldMk cId="2764131050" sldId="2145706278"/>
@@ -289,7 +354,7 @@
           </ac:cxnSpMkLst>
         </pc:cxnChg>
         <pc:cxnChg chg="mod">
-          <ac:chgData name="Graf Thomas, INI-NET-VNC-HCS" userId="487bc3e3-9ce7-4cdd-b7b4-8899ea88d289" providerId="ADAL" clId="{43074B02-ABBA-4EEC-B56D-658988DD2B14}" dt="2024-11-27T05:38:37.263" v="30" actId="1076"/>
+          <ac:chgData name="Graf Thomas, INI-NET-VNC-HCS" userId="487bc3e3-9ce7-4cdd-b7b4-8899ea88d289" providerId="ADAL" clId="{43074B02-ABBA-4EEC-B56D-658988DD2B14}" dt="2024-11-29T10:41:40.487" v="403" actId="1076"/>
           <ac:cxnSpMkLst>
             <pc:docMk/>
             <pc:sldMk cId="2764131050" sldId="2145706278"/>
@@ -297,7 +362,7 @@
           </ac:cxnSpMkLst>
         </pc:cxnChg>
         <pc:cxnChg chg="mod">
-          <ac:chgData name="Graf Thomas, INI-NET-VNC-HCS" userId="487bc3e3-9ce7-4cdd-b7b4-8899ea88d289" providerId="ADAL" clId="{43074B02-ABBA-4EEC-B56D-658988DD2B14}" dt="2024-11-27T05:38:27.188" v="29" actId="1076"/>
+          <ac:chgData name="Graf Thomas, INI-NET-VNC-HCS" userId="487bc3e3-9ce7-4cdd-b7b4-8899ea88d289" providerId="ADAL" clId="{43074B02-ABBA-4EEC-B56D-658988DD2B14}" dt="2024-11-29T10:41:42.038" v="404" actId="1076"/>
           <ac:cxnSpMkLst>
             <pc:docMk/>
             <pc:sldMk cId="2764131050" sldId="2145706278"/>
@@ -340,6 +405,29 @@
             <pc:docMk/>
             <pc:sldMk cId="1315775908" sldId="2145706280"/>
             <ac:spMk id="18" creationId="{B283EDB4-CFDF-D6B9-8AF9-9CFA563360E3}"/>
+          </ac:spMkLst>
+        </pc:spChg>
+      </pc:sldChg>
+      <pc:sldChg chg="modSp add mod">
+        <pc:chgData name="Graf Thomas, INI-NET-VNC-HCS" userId="487bc3e3-9ce7-4cdd-b7b4-8899ea88d289" providerId="ADAL" clId="{43074B02-ABBA-4EEC-B56D-658988DD2B14}" dt="2024-11-29T10:51:57.605" v="500" actId="20577"/>
+        <pc:sldMkLst>
+          <pc:docMk/>
+          <pc:sldMk cId="904770719" sldId="2145706281"/>
+        </pc:sldMkLst>
+        <pc:spChg chg="mod">
+          <ac:chgData name="Graf Thomas, INI-NET-VNC-HCS" userId="487bc3e3-9ce7-4cdd-b7b4-8899ea88d289" providerId="ADAL" clId="{43074B02-ABBA-4EEC-B56D-658988DD2B14}" dt="2024-11-29T10:51:57.605" v="500" actId="20577"/>
+          <ac:spMkLst>
+            <pc:docMk/>
+            <pc:sldMk cId="904770719" sldId="2145706281"/>
+            <ac:spMk id="5" creationId="{0194B37B-813A-99FE-7B78-4D87D8C30D44}"/>
+          </ac:spMkLst>
+        </pc:spChg>
+        <pc:spChg chg="mod">
+          <ac:chgData name="Graf Thomas, INI-NET-VNC-HCS" userId="487bc3e3-9ce7-4cdd-b7b4-8899ea88d289" providerId="ADAL" clId="{43074B02-ABBA-4EEC-B56D-658988DD2B14}" dt="2024-11-29T10:35:09.050" v="51"/>
+          <ac:spMkLst>
+            <pc:docMk/>
+            <pc:sldMk cId="904770719" sldId="2145706281"/>
+            <ac:spMk id="19" creationId="{56D79134-17A9-8BC8-B7D0-97BCFFB9A6B2}"/>
           </ac:spMkLst>
         </pc:spChg>
       </pc:sldChg>
@@ -430,7 +518,7 @@
           <a:p>
             <a:fld id="{E5E705E9-673F-4AC4-B29E-A7B26F3B8523}" type="datetimeFigureOut">
               <a:rPr lang="de-CH" smtClean="0"/>
-              <a:t>26.11.2024</a:t>
+              <a:t>29.11.2024</a:t>
             </a:fld>
             <a:endParaRPr lang="de-CH"/>
           </a:p>
@@ -763,7 +851,7 @@
           <a:p>
             <a:fld id="{2BBC52A0-2F3F-497F-8536-39D60282E9C2}" type="slidenum">
               <a:rPr lang="de-CH" smtClean="0"/>
-              <a:t>3</a:t>
+              <a:t>4</a:t>
             </a:fld>
             <a:endParaRPr lang="de-CH"/>
           </a:p>
@@ -847,7 +935,7 @@
           <a:p>
             <a:fld id="{2BBC52A0-2F3F-497F-8536-39D60282E9C2}" type="slidenum">
               <a:rPr lang="de-CH" smtClean="0"/>
-              <a:t>8</a:t>
+              <a:t>10</a:t>
             </a:fld>
             <a:endParaRPr lang="de-CH"/>
           </a:p>
@@ -1015,7 +1103,7 @@
           <a:p>
             <a:fld id="{9E9B238C-2335-4007-98C9-471C02CC43B6}" type="datetimeFigureOut">
               <a:rPr lang="de-CH" smtClean="0"/>
-              <a:t>26.11.2024</a:t>
+              <a:t>29.11.2024</a:t>
             </a:fld>
             <a:endParaRPr lang="de-CH"/>
           </a:p>
@@ -1215,7 +1303,7 @@
           <a:p>
             <a:fld id="{9E9B238C-2335-4007-98C9-471C02CC43B6}" type="datetimeFigureOut">
               <a:rPr lang="de-CH" smtClean="0"/>
-              <a:t>26.11.2024</a:t>
+              <a:t>29.11.2024</a:t>
             </a:fld>
             <a:endParaRPr lang="de-CH"/>
           </a:p>
@@ -1425,7 +1513,7 @@
           <a:p>
             <a:fld id="{9E9B238C-2335-4007-98C9-471C02CC43B6}" type="datetimeFigureOut">
               <a:rPr lang="de-CH" smtClean="0"/>
-              <a:t>26.11.2024</a:t>
+              <a:t>29.11.2024</a:t>
             </a:fld>
             <a:endParaRPr lang="de-CH"/>
           </a:p>
@@ -1854,7 +1942,7 @@
           <a:p>
             <a:fld id="{9E9B238C-2335-4007-98C9-471C02CC43B6}" type="datetimeFigureOut">
               <a:rPr lang="de-CH" smtClean="0"/>
-              <a:t>26.11.2024</a:t>
+              <a:t>29.11.2024</a:t>
             </a:fld>
             <a:endParaRPr lang="de-CH"/>
           </a:p>
@@ -2130,7 +2218,7 @@
           <a:p>
             <a:fld id="{9E9B238C-2335-4007-98C9-471C02CC43B6}" type="datetimeFigureOut">
               <a:rPr lang="de-CH" smtClean="0"/>
-              <a:t>26.11.2024</a:t>
+              <a:t>29.11.2024</a:t>
             </a:fld>
             <a:endParaRPr lang="de-CH"/>
           </a:p>
@@ -2398,7 +2486,7 @@
           <a:p>
             <a:fld id="{9E9B238C-2335-4007-98C9-471C02CC43B6}" type="datetimeFigureOut">
               <a:rPr lang="de-CH" smtClean="0"/>
-              <a:t>26.11.2024</a:t>
+              <a:t>29.11.2024</a:t>
             </a:fld>
             <a:endParaRPr lang="de-CH"/>
           </a:p>
@@ -2813,7 +2901,7 @@
           <a:p>
             <a:fld id="{9E9B238C-2335-4007-98C9-471C02CC43B6}" type="datetimeFigureOut">
               <a:rPr lang="de-CH" smtClean="0"/>
-              <a:t>26.11.2024</a:t>
+              <a:t>29.11.2024</a:t>
             </a:fld>
             <a:endParaRPr lang="de-CH"/>
           </a:p>
@@ -2955,7 +3043,7 @@
           <a:p>
             <a:fld id="{9E9B238C-2335-4007-98C9-471C02CC43B6}" type="datetimeFigureOut">
               <a:rPr lang="de-CH" smtClean="0"/>
-              <a:t>26.11.2024</a:t>
+              <a:t>29.11.2024</a:t>
             </a:fld>
             <a:endParaRPr lang="de-CH"/>
           </a:p>
@@ -3068,7 +3156,7 @@
           <a:p>
             <a:fld id="{9E9B238C-2335-4007-98C9-471C02CC43B6}" type="datetimeFigureOut">
               <a:rPr lang="de-CH" smtClean="0"/>
-              <a:t>26.11.2024</a:t>
+              <a:t>29.11.2024</a:t>
             </a:fld>
             <a:endParaRPr lang="de-CH"/>
           </a:p>
@@ -3381,7 +3469,7 @@
           <a:p>
             <a:fld id="{9E9B238C-2335-4007-98C9-471C02CC43B6}" type="datetimeFigureOut">
               <a:rPr lang="de-CH" smtClean="0"/>
-              <a:t>26.11.2024</a:t>
+              <a:t>29.11.2024</a:t>
             </a:fld>
             <a:endParaRPr lang="de-CH"/>
           </a:p>
@@ -3670,7 +3758,7 @@
           <a:p>
             <a:fld id="{9E9B238C-2335-4007-98C9-471C02CC43B6}" type="datetimeFigureOut">
               <a:rPr lang="de-CH" smtClean="0"/>
-              <a:t>26.11.2024</a:t>
+              <a:t>29.11.2024</a:t>
             </a:fld>
             <a:endParaRPr lang="de-CH"/>
           </a:p>
@@ -3913,7 +4001,7 @@
           <a:p>
             <a:fld id="{9E9B238C-2335-4007-98C9-471C02CC43B6}" type="datetimeFigureOut">
               <a:rPr lang="de-CH" smtClean="0"/>
-              <a:t>26.11.2024</a:t>
+              <a:t>29.11.2024</a:t>
             </a:fld>
             <a:endParaRPr lang="de-CH"/>
           </a:p>
@@ -4333,6 +4421,1195 @@
       </p:grpSpPr>
       <p:sp>
         <p:nvSpPr>
+          <p:cNvPr id="5" name="Titel 1">
+            <a:extLst>
+              <a:ext uri="{FF2B5EF4-FFF2-40B4-BE49-F238E27FC236}">
+                <a16:creationId xmlns:a16="http://schemas.microsoft.com/office/drawing/2014/main" id="{C26208B2-0D10-4C23-B2DE-372A62E98644}"/>
+              </a:ext>
+            </a:extLst>
+          </p:cNvPr>
+          <p:cNvSpPr txBox="1">
+            <a:spLocks/>
+          </p:cNvSpPr>
+          <p:nvPr/>
+        </p:nvSpPr>
+        <p:spPr>
+          <a:xfrm>
+            <a:off x="606830" y="1365771"/>
+            <a:ext cx="11395314" cy="4260587"/>
+          </a:xfrm>
+          <a:prstGeom prst="rect">
+            <a:avLst/>
+          </a:prstGeom>
+        </p:spPr>
+        <p:txBody>
+          <a:bodyPr vert="horz" lIns="91440" tIns="45720" rIns="91440" bIns="45720" rtlCol="0" anchor="ctr">
+            <a:normAutofit fontScale="92500" lnSpcReduction="10000"/>
+          </a:bodyPr>
+          <a:lstStyle>
+            <a:lvl1pPr algn="l" defTabSz="914400" rtl="0" eaLnBrk="1" latinLnBrk="0" hangingPunct="1">
+              <a:lnSpc>
+                <a:spcPct val="90000"/>
+              </a:lnSpc>
+              <a:spcBef>
+                <a:spcPct val="0"/>
+              </a:spcBef>
+              <a:buNone/>
+              <a:defRPr sz="4400" kern="1200">
+                <a:solidFill>
+                  <a:schemeClr val="tx1"/>
+                </a:solidFill>
+                <a:latin typeface="+mj-lt"/>
+                <a:ea typeface="+mj-ea"/>
+                <a:cs typeface="+mj-cs"/>
+              </a:defRPr>
+            </a:lvl1pPr>
+          </a:lstStyle>
+          <a:p>
+            <a:r>
+              <a:rPr lang="en-US" sz="3400" b="1" dirty="0"/>
+              <a:t>IAB NEMOPS Position Paper</a:t>
+            </a:r>
+            <a:br>
+              <a:rPr lang="en-US" sz="3400" b="1" dirty="0"/>
+            </a:br>
+            <a:endParaRPr lang="en-US" sz="3400" b="1" dirty="0"/>
+          </a:p>
+          <a:p>
+            <a:r>
+              <a:rPr lang="en-US" sz="3400" b="1" dirty="0">
+                <a:solidFill>
+                  <a:srgbClr val="FF0000"/>
+                </a:solidFill>
+              </a:rPr>
+              <a:t>Agile Incremental Driven Development </a:t>
+            </a:r>
+            <a:r>
+              <a:rPr lang="en-US" sz="3400" b="1" dirty="0"/>
+              <a:t>for Network Management</a:t>
+            </a:r>
+          </a:p>
+          <a:p>
+            <a:endParaRPr lang="en-US" sz="2800" dirty="0"/>
+          </a:p>
+          <a:p>
+            <a:br>
+              <a:rPr lang="en-US" sz="2800" dirty="0"/>
+            </a:br>
+            <a:r>
+              <a:rPr lang="en-US" sz="2800" dirty="0"/>
+              <a:t>Thomas Graf, Swisscom</a:t>
+            </a:r>
+          </a:p>
+          <a:p>
+            <a:r>
+              <a:rPr lang="en-US" sz="2800" dirty="0"/>
+              <a:t>Holger Keller, DT</a:t>
+            </a:r>
+          </a:p>
+          <a:p>
+            <a:r>
+              <a:rPr lang="en-US" sz="2800" dirty="0"/>
+              <a:t>Dan Voyer, Bell Canada</a:t>
+            </a:r>
+          </a:p>
+          <a:p>
+            <a:r>
+              <a:rPr lang="en-US" sz="2800" dirty="0"/>
+              <a:t>Paolo Lucente, NTT</a:t>
+            </a:r>
+          </a:p>
+          <a:p>
+            <a:r>
+              <a:rPr lang="en-US" sz="2800" dirty="0"/>
+              <a:t>Benoit Claise, Huawei</a:t>
+            </a:r>
+          </a:p>
+          <a:p>
+            <a:r>
+              <a:rPr lang="en-US" sz="2800" dirty="0"/>
+              <a:t>Rob Wilton, Cisco</a:t>
+            </a:r>
+          </a:p>
+          <a:p>
+            <a:r>
+              <a:rPr lang="en-US" sz="2800" dirty="0"/>
+              <a:t>Alex Huang-Feng and Pierre Francois, INSA Lyon</a:t>
+            </a:r>
+          </a:p>
+        </p:txBody>
+      </p:sp>
+      <p:sp>
+        <p:nvSpPr>
+          <p:cNvPr id="2" name="Slide Number Placeholder 1">
+            <a:extLst>
+              <a:ext uri="{FF2B5EF4-FFF2-40B4-BE49-F238E27FC236}">
+                <a16:creationId xmlns:a16="http://schemas.microsoft.com/office/drawing/2014/main" id="{AD23057C-339A-4254-8994-8EB77B8B4163}"/>
+              </a:ext>
+            </a:extLst>
+          </p:cNvPr>
+          <p:cNvSpPr>
+            <a:spLocks noGrp="1"/>
+          </p:cNvSpPr>
+          <p:nvPr>
+            <p:ph type="sldNum" sz="quarter" idx="12"/>
+          </p:nvPr>
+        </p:nvSpPr>
+        <p:spPr>
+          <a:xfrm>
+            <a:off x="11587892" y="6361637"/>
+            <a:ext cx="414251" cy="365125"/>
+          </a:xfrm>
+        </p:spPr>
+        <p:txBody>
+          <a:bodyPr/>
+          <a:lstStyle/>
+          <a:p>
+            <a:fld id="{FC4AC485-25DE-431E-B345-9C0A15BB7F8A}" type="slidenum">
+              <a:rPr lang="de-CH" sz="2200" smtClean="0"/>
+              <a:t>1</a:t>
+            </a:fld>
+            <a:endParaRPr lang="de-CH" sz="2200" dirty="0"/>
+          </a:p>
+        </p:txBody>
+      </p:sp>
+    </p:spTree>
+    <p:extLst>
+      <p:ext uri="{BB962C8B-B14F-4D97-AF65-F5344CB8AC3E}">
+        <p14:creationId xmlns:p14="http://schemas.microsoft.com/office/powerpoint/2010/main" val="3578665336"/>
+      </p:ext>
+    </p:extLst>
+  </p:cSld>
+  <p:clrMapOvr>
+    <a:masterClrMapping/>
+  </p:clrMapOvr>
+</p:sld>
+</file>
+
+<file path=ppt/slides/slide10.xml><?xml version="1.0" encoding="utf-8"?>
+<p:sld xmlns:a="http://schemas.openxmlformats.org/drawingml/2006/main" xmlns:r="http://schemas.openxmlformats.org/officeDocument/2006/relationships" xmlns:p="http://schemas.openxmlformats.org/presentationml/2006/main">
+  <p:cSld>
+    <p:spTree>
+      <p:nvGrpSpPr>
+        <p:cNvPr id="1" name=""/>
+        <p:cNvGrpSpPr/>
+        <p:nvPr/>
+      </p:nvGrpSpPr>
+      <p:grpSpPr>
+        <a:xfrm>
+          <a:off x="0" y="0"/>
+          <a:ext cx="0" cy="0"/>
+          <a:chOff x="0" y="0"/>
+          <a:chExt cx="0" cy="0"/>
+        </a:xfrm>
+      </p:grpSpPr>
+      <p:sp>
+        <p:nvSpPr>
+          <p:cNvPr id="2" name="Title 1">
+            <a:extLst>
+              <a:ext uri="{FF2B5EF4-FFF2-40B4-BE49-F238E27FC236}">
+                <a16:creationId xmlns:a16="http://schemas.microsoft.com/office/drawing/2014/main" id="{FF20F271-6F0D-4AC0-BB1D-F5C338165C13}"/>
+              </a:ext>
+            </a:extLst>
+          </p:cNvPr>
+          <p:cNvSpPr>
+            <a:spLocks noGrp="1"/>
+          </p:cNvSpPr>
+          <p:nvPr>
+            <p:ph type="title"/>
+          </p:nvPr>
+        </p:nvSpPr>
+        <p:spPr/>
+        <p:txBody>
+          <a:bodyPr>
+            <a:normAutofit/>
+          </a:bodyPr>
+          <a:lstStyle/>
+          <a:p>
+            <a:r>
+              <a:rPr lang="en-US" sz="2800" b="1" dirty="0"/>
+              <a:t>Addressing YANG Specification and Integration Gaps</a:t>
+            </a:r>
+            <a:br>
+              <a:rPr lang="en-GB" sz="3600" dirty="0"/>
+            </a:br>
+            <a:r>
+              <a:rPr lang="en-US" sz="2700" dirty="0">
+                <a:solidFill>
+                  <a:schemeClr val="bg2">
+                    <a:lumMod val="75000"/>
+                  </a:schemeClr>
+                </a:solidFill>
+              </a:rPr>
+              <a:t>11 documents piling up at NETCONF, NETMOD and NMOP…</a:t>
+            </a:r>
+          </a:p>
+        </p:txBody>
+      </p:sp>
+      <p:sp>
+        <p:nvSpPr>
+          <p:cNvPr id="3" name="Content Placeholder 2">
+            <a:extLst>
+              <a:ext uri="{FF2B5EF4-FFF2-40B4-BE49-F238E27FC236}">
+                <a16:creationId xmlns:a16="http://schemas.microsoft.com/office/drawing/2014/main" id="{29C0DFD4-432D-4B0C-93DF-790441DCF5B9}"/>
+              </a:ext>
+            </a:extLst>
+          </p:cNvPr>
+          <p:cNvSpPr>
+            <a:spLocks noGrp="1"/>
+          </p:cNvSpPr>
+          <p:nvPr>
+            <p:ph idx="1"/>
+          </p:nvPr>
+        </p:nvSpPr>
+        <p:spPr>
+          <a:xfrm>
+            <a:off x="838199" y="1690688"/>
+            <a:ext cx="4732177" cy="4486275"/>
+          </a:xfrm>
+        </p:spPr>
+        <p:txBody>
+          <a:bodyPr>
+            <a:noAutofit/>
+          </a:bodyPr>
+          <a:lstStyle/>
+          <a:p>
+            <a:pPr marL="0" indent="0">
+              <a:buNone/>
+            </a:pPr>
+            <a:r>
+              <a:rPr lang="en-US" sz="1800" b="1" dirty="0"/>
+              <a:t>YANG-Push Transport Gaps:</a:t>
+            </a:r>
+            <a:endParaRPr lang="en-US" sz="1800" dirty="0"/>
+          </a:p>
+          <a:p>
+            <a:pPr>
+              <a:spcBef>
+                <a:spcPts val="300"/>
+              </a:spcBef>
+            </a:pPr>
+            <a:r>
+              <a:rPr lang="en-US" sz="1600" dirty="0"/>
+              <a:t>UDP-based Transport for Configured Subscriptions</a:t>
+            </a:r>
+            <a:br>
+              <a:rPr lang="en-US" sz="1600" dirty="0"/>
+            </a:br>
+            <a:r>
+              <a:rPr lang="en-US" sz="1600" dirty="0">
+                <a:hlinkClick r:id="rId3"/>
+              </a:rPr>
+              <a:t>draft-</a:t>
+            </a:r>
+            <a:r>
+              <a:rPr lang="en-US" sz="1600" dirty="0" err="1">
+                <a:hlinkClick r:id="rId3"/>
+              </a:rPr>
+              <a:t>ietf</a:t>
+            </a:r>
+            <a:r>
+              <a:rPr lang="en-US" sz="1600" dirty="0">
+                <a:hlinkClick r:id="rId3"/>
+              </a:rPr>
+              <a:t>-netconf-</a:t>
+            </a:r>
+            <a:r>
+              <a:rPr lang="en-US" sz="1600" dirty="0" err="1">
+                <a:hlinkClick r:id="rId3"/>
+              </a:rPr>
+              <a:t>udp</a:t>
+            </a:r>
+            <a:r>
+              <a:rPr lang="en-US" sz="1600" dirty="0">
+                <a:hlinkClick r:id="rId3"/>
+              </a:rPr>
+              <a:t>-</a:t>
+            </a:r>
+            <a:r>
+              <a:rPr lang="en-US" sz="1600" dirty="0" err="1">
+                <a:hlinkClick r:id="rId3"/>
+              </a:rPr>
+              <a:t>notif</a:t>
+            </a:r>
+            <a:endParaRPr lang="en-US" sz="1600" dirty="0"/>
+          </a:p>
+          <a:p>
+            <a:pPr>
+              <a:spcBef>
+                <a:spcPts val="300"/>
+              </a:spcBef>
+            </a:pPr>
+            <a:r>
+              <a:rPr lang="en-US" sz="1600" dirty="0"/>
+              <a:t>Subscription to Distributed Notifications</a:t>
+            </a:r>
+            <a:br>
+              <a:rPr lang="en-US" sz="1600" dirty="0"/>
+            </a:br>
+            <a:r>
+              <a:rPr lang="en-US" sz="1600" dirty="0">
+                <a:hlinkClick r:id="rId4"/>
+              </a:rPr>
+              <a:t>draft-</a:t>
+            </a:r>
+            <a:r>
+              <a:rPr lang="en-US" sz="1600" dirty="0" err="1">
+                <a:hlinkClick r:id="rId4"/>
+              </a:rPr>
+              <a:t>ietf</a:t>
+            </a:r>
+            <a:r>
+              <a:rPr lang="en-US" sz="1600" dirty="0">
+                <a:hlinkClick r:id="rId4"/>
+              </a:rPr>
+              <a:t>-netconf-distributed-</a:t>
+            </a:r>
+            <a:r>
+              <a:rPr lang="en-US" sz="1600" dirty="0" err="1">
+                <a:hlinkClick r:id="rId4"/>
+              </a:rPr>
+              <a:t>notif</a:t>
+            </a:r>
+            <a:endParaRPr lang="en-US" sz="1600" b="1" dirty="0"/>
+          </a:p>
+          <a:p>
+            <a:pPr marL="0" indent="0">
+              <a:buNone/>
+            </a:pPr>
+            <a:r>
+              <a:rPr lang="en-US" sz="1800" b="1" dirty="0"/>
+              <a:t>YANG-Push Specifications Gaps:</a:t>
+            </a:r>
+            <a:endParaRPr lang="en-US" sz="1800" dirty="0"/>
+          </a:p>
+          <a:p>
+            <a:pPr>
+              <a:spcBef>
+                <a:spcPts val="300"/>
+              </a:spcBef>
+            </a:pPr>
+            <a:r>
+              <a:rPr lang="en-US" sz="1600" dirty="0"/>
+              <a:t>Extensible YANG model for YANG-Push Notifications</a:t>
+            </a:r>
+            <a:br>
+              <a:rPr lang="en-US" sz="1600" dirty="0"/>
+            </a:br>
+            <a:r>
+              <a:rPr lang="en-US" sz="1600" dirty="0">
+                <a:ea typeface="Times New Roman" panose="02020603050405020304" pitchFamily="18" charset="0"/>
+                <a:hlinkClick r:id="rId5"/>
+              </a:rPr>
+              <a:t>draft-</a:t>
+            </a:r>
+            <a:r>
+              <a:rPr lang="en-US" sz="1600" dirty="0" err="1">
+                <a:ea typeface="Times New Roman" panose="02020603050405020304" pitchFamily="18" charset="0"/>
+                <a:hlinkClick r:id="rId5"/>
+              </a:rPr>
+              <a:t>netana</a:t>
+            </a:r>
+            <a:r>
+              <a:rPr lang="en-US" sz="1600" dirty="0">
+                <a:ea typeface="Times New Roman" panose="02020603050405020304" pitchFamily="18" charset="0"/>
+                <a:hlinkClick r:id="rId5"/>
+              </a:rPr>
+              <a:t>-netconf-</a:t>
+            </a:r>
+            <a:r>
+              <a:rPr lang="en-US" sz="1600" dirty="0" err="1">
+                <a:ea typeface="Times New Roman" panose="02020603050405020304" pitchFamily="18" charset="0"/>
+                <a:hlinkClick r:id="rId5"/>
+              </a:rPr>
+              <a:t>notif</a:t>
+            </a:r>
+            <a:r>
+              <a:rPr lang="en-US" sz="1600" dirty="0">
+                <a:ea typeface="Times New Roman" panose="02020603050405020304" pitchFamily="18" charset="0"/>
+                <a:hlinkClick r:id="rId5"/>
+              </a:rPr>
+              <a:t>-envelope</a:t>
+            </a:r>
+            <a:endParaRPr lang="en-US" sz="1600" dirty="0">
+              <a:ea typeface="Times New Roman" panose="02020603050405020304" pitchFamily="18" charset="0"/>
+            </a:endParaRPr>
+          </a:p>
+          <a:p>
+            <a:pPr>
+              <a:spcBef>
+                <a:spcPts val="300"/>
+              </a:spcBef>
+            </a:pPr>
+            <a:r>
+              <a:rPr lang="en-US" sz="1600" dirty="0">
+                <a:ea typeface="Times New Roman" panose="02020603050405020304" pitchFamily="18" charset="0"/>
+              </a:rPr>
+              <a:t>YANG Notification Transport Capabilities</a:t>
+            </a:r>
+            <a:br>
+              <a:rPr lang="en-US" sz="1600" dirty="0">
+                <a:ea typeface="Times New Roman" panose="02020603050405020304" pitchFamily="18" charset="0"/>
+              </a:rPr>
+            </a:br>
+            <a:r>
+              <a:rPr lang="en-US" sz="1600" dirty="0">
+                <a:ea typeface="Times New Roman" panose="02020603050405020304" pitchFamily="18" charset="0"/>
+                <a:hlinkClick r:id="rId6"/>
+              </a:rPr>
+              <a:t>draft-</a:t>
+            </a:r>
+            <a:r>
+              <a:rPr lang="en-US" sz="1600" dirty="0" err="1">
+                <a:ea typeface="Times New Roman" panose="02020603050405020304" pitchFamily="18" charset="0"/>
+                <a:hlinkClick r:id="rId6"/>
+              </a:rPr>
+              <a:t>netana</a:t>
+            </a:r>
+            <a:r>
+              <a:rPr lang="en-US" sz="1600" dirty="0">
+                <a:ea typeface="Times New Roman" panose="02020603050405020304" pitchFamily="18" charset="0"/>
+                <a:hlinkClick r:id="rId6"/>
+              </a:rPr>
+              <a:t>-netconf-</a:t>
+            </a:r>
+            <a:r>
+              <a:rPr lang="en-US" sz="1600" dirty="0" err="1">
+                <a:ea typeface="Times New Roman" panose="02020603050405020304" pitchFamily="18" charset="0"/>
+                <a:hlinkClick r:id="rId6"/>
+              </a:rPr>
+              <a:t>yp</a:t>
+            </a:r>
+            <a:r>
+              <a:rPr lang="en-US" sz="1600" dirty="0">
+                <a:ea typeface="Times New Roman" panose="02020603050405020304" pitchFamily="18" charset="0"/>
+                <a:hlinkClick r:id="rId6"/>
+              </a:rPr>
+              <a:t>-transport-capabilities</a:t>
+            </a:r>
+            <a:endParaRPr lang="en-US" sz="1600" dirty="0">
+              <a:ea typeface="Times New Roman" panose="02020603050405020304" pitchFamily="18" charset="0"/>
+            </a:endParaRPr>
+          </a:p>
+          <a:p>
+            <a:pPr>
+              <a:spcBef>
+                <a:spcPts val="300"/>
+              </a:spcBef>
+            </a:pPr>
+            <a:r>
+              <a:rPr lang="en-US" sz="1600" dirty="0"/>
+              <a:t>Validating </a:t>
+            </a:r>
+            <a:r>
+              <a:rPr lang="en-US" sz="1600" dirty="0" err="1"/>
+              <a:t>anydata</a:t>
+            </a:r>
+            <a:r>
+              <a:rPr lang="en-US" sz="1600" dirty="0"/>
+              <a:t> in YANG Library context</a:t>
+            </a:r>
+            <a:br>
+              <a:rPr lang="en-US" sz="1600" dirty="0"/>
+            </a:br>
+            <a:r>
+              <a:rPr lang="en-US" sz="1600" dirty="0">
+                <a:hlinkClick r:id="rId7"/>
+              </a:rPr>
+              <a:t>draft-</a:t>
+            </a:r>
+            <a:r>
+              <a:rPr lang="en-US" sz="1600" dirty="0" err="1">
+                <a:hlinkClick r:id="rId7"/>
+              </a:rPr>
+              <a:t>aelhassany</a:t>
+            </a:r>
+            <a:r>
+              <a:rPr lang="en-US" sz="1600" dirty="0">
+                <a:hlinkClick r:id="rId7"/>
+              </a:rPr>
+              <a:t>-</a:t>
+            </a:r>
+            <a:r>
+              <a:rPr lang="en-US" sz="1600" dirty="0" err="1">
+                <a:hlinkClick r:id="rId7"/>
+              </a:rPr>
+              <a:t>anydata</a:t>
+            </a:r>
+            <a:r>
+              <a:rPr lang="en-US" sz="1600" dirty="0">
+                <a:hlinkClick r:id="rId7"/>
+              </a:rPr>
+              <a:t>-validation</a:t>
+            </a:r>
+            <a:endParaRPr lang="en-US" sz="1600" b="1" dirty="0">
+              <a:solidFill>
+                <a:srgbClr val="FF0000"/>
+              </a:solidFill>
+            </a:endParaRPr>
+          </a:p>
+        </p:txBody>
+      </p:sp>
+      <p:sp>
+        <p:nvSpPr>
+          <p:cNvPr id="6" name="Slide Number Placeholder 1">
+            <a:extLst>
+              <a:ext uri="{FF2B5EF4-FFF2-40B4-BE49-F238E27FC236}">
+                <a16:creationId xmlns:a16="http://schemas.microsoft.com/office/drawing/2014/main" id="{3D5EE238-429C-4784-8E42-1813EF45704D}"/>
+              </a:ext>
+            </a:extLst>
+          </p:cNvPr>
+          <p:cNvSpPr>
+            <a:spLocks noGrp="1"/>
+          </p:cNvSpPr>
+          <p:nvPr>
+            <p:ph type="sldNum" sz="quarter" idx="12"/>
+          </p:nvPr>
+        </p:nvSpPr>
+        <p:spPr>
+          <a:xfrm>
+            <a:off x="11587892" y="6361637"/>
+            <a:ext cx="414251" cy="365125"/>
+          </a:xfrm>
+        </p:spPr>
+        <p:txBody>
+          <a:bodyPr/>
+          <a:lstStyle/>
+          <a:p>
+            <a:fld id="{FC4AC485-25DE-431E-B345-9C0A15BB7F8A}" type="slidenum">
+              <a:rPr lang="de-CH" sz="1400" smtClean="0"/>
+              <a:t>10</a:t>
+            </a:fld>
+            <a:endParaRPr lang="de-CH" sz="1400" dirty="0"/>
+          </a:p>
+        </p:txBody>
+      </p:sp>
+      <p:sp>
+        <p:nvSpPr>
+          <p:cNvPr id="4" name="Content Placeholder 2">
+            <a:extLst>
+              <a:ext uri="{FF2B5EF4-FFF2-40B4-BE49-F238E27FC236}">
+                <a16:creationId xmlns:a16="http://schemas.microsoft.com/office/drawing/2014/main" id="{847B953C-E781-5A94-33AD-E38789C4C7F0}"/>
+              </a:ext>
+            </a:extLst>
+          </p:cNvPr>
+          <p:cNvSpPr txBox="1">
+            <a:spLocks/>
+          </p:cNvSpPr>
+          <p:nvPr/>
+        </p:nvSpPr>
+        <p:spPr>
+          <a:xfrm>
+            <a:off x="5946711" y="1690688"/>
+            <a:ext cx="6245289" cy="3366504"/>
+          </a:xfrm>
+          <a:prstGeom prst="rect">
+            <a:avLst/>
+          </a:prstGeom>
+        </p:spPr>
+        <p:txBody>
+          <a:bodyPr vert="horz" lIns="91440" tIns="45720" rIns="91440" bIns="45720" rtlCol="0">
+            <a:noAutofit/>
+          </a:bodyPr>
+          <a:lstStyle>
+            <a:lvl1pPr marL="228600" indent="-228600" algn="l" defTabSz="914400" rtl="0" eaLnBrk="1" latinLnBrk="0" hangingPunct="1">
+              <a:lnSpc>
+                <a:spcPct val="90000"/>
+              </a:lnSpc>
+              <a:spcBef>
+                <a:spcPts val="1000"/>
+              </a:spcBef>
+              <a:buFont typeface="Arial" panose="020B0604020202020204" pitchFamily="34" charset="0"/>
+              <a:buChar char="•"/>
+              <a:defRPr sz="2800" kern="1200">
+                <a:solidFill>
+                  <a:schemeClr val="tx1"/>
+                </a:solidFill>
+                <a:latin typeface="+mn-lt"/>
+                <a:ea typeface="+mn-ea"/>
+                <a:cs typeface="+mn-cs"/>
+              </a:defRPr>
+            </a:lvl1pPr>
+            <a:lvl2pPr marL="685800" indent="-228600" algn="l" defTabSz="914400" rtl="0" eaLnBrk="1" latinLnBrk="0" hangingPunct="1">
+              <a:lnSpc>
+                <a:spcPct val="90000"/>
+              </a:lnSpc>
+              <a:spcBef>
+                <a:spcPts val="500"/>
+              </a:spcBef>
+              <a:buFont typeface="Arial" panose="020B0604020202020204" pitchFamily="34" charset="0"/>
+              <a:buChar char="•"/>
+              <a:defRPr sz="2400" kern="1200">
+                <a:solidFill>
+                  <a:schemeClr val="tx1"/>
+                </a:solidFill>
+                <a:latin typeface="+mn-lt"/>
+                <a:ea typeface="+mn-ea"/>
+                <a:cs typeface="+mn-cs"/>
+              </a:defRPr>
+            </a:lvl2pPr>
+            <a:lvl3pPr marL="1143000" indent="-228600" algn="l" defTabSz="914400" rtl="0" eaLnBrk="1" latinLnBrk="0" hangingPunct="1">
+              <a:lnSpc>
+                <a:spcPct val="90000"/>
+              </a:lnSpc>
+              <a:spcBef>
+                <a:spcPts val="500"/>
+              </a:spcBef>
+              <a:buFont typeface="Arial" panose="020B0604020202020204" pitchFamily="34" charset="0"/>
+              <a:buChar char="•"/>
+              <a:defRPr sz="2000" kern="1200">
+                <a:solidFill>
+                  <a:schemeClr val="tx1"/>
+                </a:solidFill>
+                <a:latin typeface="+mn-lt"/>
+                <a:ea typeface="+mn-ea"/>
+                <a:cs typeface="+mn-cs"/>
+              </a:defRPr>
+            </a:lvl3pPr>
+            <a:lvl4pPr marL="1600200" indent="-228600" algn="l" defTabSz="914400" rtl="0" eaLnBrk="1" latinLnBrk="0" hangingPunct="1">
+              <a:lnSpc>
+                <a:spcPct val="90000"/>
+              </a:lnSpc>
+              <a:spcBef>
+                <a:spcPts val="500"/>
+              </a:spcBef>
+              <a:buFont typeface="Arial" panose="020B0604020202020204" pitchFamily="34" charset="0"/>
+              <a:buChar char="•"/>
+              <a:defRPr sz="1800" kern="1200">
+                <a:solidFill>
+                  <a:schemeClr val="tx1"/>
+                </a:solidFill>
+                <a:latin typeface="+mn-lt"/>
+                <a:ea typeface="+mn-ea"/>
+                <a:cs typeface="+mn-cs"/>
+              </a:defRPr>
+            </a:lvl4pPr>
+            <a:lvl5pPr marL="2057400" indent="-228600" algn="l" defTabSz="914400" rtl="0" eaLnBrk="1" latinLnBrk="0" hangingPunct="1">
+              <a:lnSpc>
+                <a:spcPct val="90000"/>
+              </a:lnSpc>
+              <a:spcBef>
+                <a:spcPts val="500"/>
+              </a:spcBef>
+              <a:buFont typeface="Arial" panose="020B0604020202020204" pitchFamily="34" charset="0"/>
+              <a:buChar char="•"/>
+              <a:defRPr sz="1800" kern="1200">
+                <a:solidFill>
+                  <a:schemeClr val="tx1"/>
+                </a:solidFill>
+                <a:latin typeface="+mn-lt"/>
+                <a:ea typeface="+mn-ea"/>
+                <a:cs typeface="+mn-cs"/>
+              </a:defRPr>
+            </a:lvl5pPr>
+            <a:lvl6pPr marL="2514600" indent="-228600" algn="l" defTabSz="914400" rtl="0" eaLnBrk="1" latinLnBrk="0" hangingPunct="1">
+              <a:lnSpc>
+                <a:spcPct val="90000"/>
+              </a:lnSpc>
+              <a:spcBef>
+                <a:spcPts val="500"/>
+              </a:spcBef>
+              <a:buFont typeface="Arial" panose="020B0604020202020204" pitchFamily="34" charset="0"/>
+              <a:buChar char="•"/>
+              <a:defRPr sz="1800" kern="1200">
+                <a:solidFill>
+                  <a:schemeClr val="tx1"/>
+                </a:solidFill>
+                <a:latin typeface="+mn-lt"/>
+                <a:ea typeface="+mn-ea"/>
+                <a:cs typeface="+mn-cs"/>
+              </a:defRPr>
+            </a:lvl6pPr>
+            <a:lvl7pPr marL="2971800" indent="-228600" algn="l" defTabSz="914400" rtl="0" eaLnBrk="1" latinLnBrk="0" hangingPunct="1">
+              <a:lnSpc>
+                <a:spcPct val="90000"/>
+              </a:lnSpc>
+              <a:spcBef>
+                <a:spcPts val="500"/>
+              </a:spcBef>
+              <a:buFont typeface="Arial" panose="020B0604020202020204" pitchFamily="34" charset="0"/>
+              <a:buChar char="•"/>
+              <a:defRPr sz="1800" kern="1200">
+                <a:solidFill>
+                  <a:schemeClr val="tx1"/>
+                </a:solidFill>
+                <a:latin typeface="+mn-lt"/>
+                <a:ea typeface="+mn-ea"/>
+                <a:cs typeface="+mn-cs"/>
+              </a:defRPr>
+            </a:lvl7pPr>
+            <a:lvl8pPr marL="3429000" indent="-228600" algn="l" defTabSz="914400" rtl="0" eaLnBrk="1" latinLnBrk="0" hangingPunct="1">
+              <a:lnSpc>
+                <a:spcPct val="90000"/>
+              </a:lnSpc>
+              <a:spcBef>
+                <a:spcPts val="500"/>
+              </a:spcBef>
+              <a:buFont typeface="Arial" panose="020B0604020202020204" pitchFamily="34" charset="0"/>
+              <a:buChar char="•"/>
+              <a:defRPr sz="1800" kern="1200">
+                <a:solidFill>
+                  <a:schemeClr val="tx1"/>
+                </a:solidFill>
+                <a:latin typeface="+mn-lt"/>
+                <a:ea typeface="+mn-ea"/>
+                <a:cs typeface="+mn-cs"/>
+              </a:defRPr>
+            </a:lvl8pPr>
+            <a:lvl9pPr marL="3886200" indent="-228600" algn="l" defTabSz="914400" rtl="0" eaLnBrk="1" latinLnBrk="0" hangingPunct="1">
+              <a:lnSpc>
+                <a:spcPct val="90000"/>
+              </a:lnSpc>
+              <a:spcBef>
+                <a:spcPts val="500"/>
+              </a:spcBef>
+              <a:buFont typeface="Arial" panose="020B0604020202020204" pitchFamily="34" charset="0"/>
+              <a:buChar char="•"/>
+              <a:defRPr sz="1800" kern="1200">
+                <a:solidFill>
+                  <a:schemeClr val="tx1"/>
+                </a:solidFill>
+                <a:latin typeface="+mn-lt"/>
+                <a:ea typeface="+mn-ea"/>
+                <a:cs typeface="+mn-cs"/>
+              </a:defRPr>
+            </a:lvl9pPr>
+          </a:lstStyle>
+          <a:p>
+            <a:pPr marL="0" indent="0">
+              <a:spcBef>
+                <a:spcPts val="1200"/>
+              </a:spcBef>
+              <a:buFont typeface="Arial" panose="020B0604020202020204" pitchFamily="34" charset="0"/>
+              <a:buNone/>
+            </a:pPr>
+            <a:r>
+              <a:rPr lang="en-US" sz="1800" b="1" dirty="0"/>
+              <a:t>YANG-Push Integration Gaps and Arch:</a:t>
+            </a:r>
+          </a:p>
+          <a:p>
+            <a:pPr>
+              <a:spcBef>
+                <a:spcPts val="300"/>
+              </a:spcBef>
+            </a:pPr>
+            <a:r>
+              <a:rPr lang="en-US" sz="1600" dirty="0"/>
+              <a:t>Support of Network Observation Timestamping in YANG Notifications</a:t>
+            </a:r>
+            <a:br>
+              <a:rPr lang="en-US" sz="1600" dirty="0"/>
+            </a:br>
+            <a:r>
+              <a:rPr lang="en-US" sz="1600" dirty="0">
+                <a:hlinkClick r:id="rId8"/>
+              </a:rPr>
+              <a:t>draft-</a:t>
+            </a:r>
+            <a:r>
+              <a:rPr lang="en-US" sz="1600" dirty="0" err="1">
+                <a:hlinkClick r:id="rId8"/>
+              </a:rPr>
+              <a:t>tgraf</a:t>
+            </a:r>
+            <a:r>
+              <a:rPr lang="en-US" sz="1600" dirty="0">
+                <a:hlinkClick r:id="rId8"/>
+              </a:rPr>
+              <a:t>-netconf-yang-push-observation-time</a:t>
+            </a:r>
+            <a:endParaRPr lang="en-US" sz="1600" dirty="0"/>
+          </a:p>
+          <a:p>
+            <a:pPr>
+              <a:spcBef>
+                <a:spcPts val="300"/>
+              </a:spcBef>
+            </a:pPr>
+            <a:r>
+              <a:rPr lang="en-US" sz="1600" dirty="0"/>
+              <a:t>Support of Versioning in YANG Notifications Subscription</a:t>
+            </a:r>
+            <a:br>
+              <a:rPr lang="en-US" sz="1600" dirty="0"/>
+            </a:br>
+            <a:r>
+              <a:rPr lang="en-US" sz="1600" dirty="0">
+                <a:hlinkClick r:id="rId9"/>
+              </a:rPr>
+              <a:t>draft-</a:t>
+            </a:r>
+            <a:r>
+              <a:rPr lang="en-US" sz="1600" dirty="0" err="1">
+                <a:hlinkClick r:id="rId9"/>
+              </a:rPr>
+              <a:t>ietf</a:t>
+            </a:r>
+            <a:r>
+              <a:rPr lang="en-US" sz="1600" dirty="0">
+                <a:hlinkClick r:id="rId9"/>
+              </a:rPr>
+              <a:t>-netconf-yang-notifications-versioning</a:t>
+            </a:r>
+            <a:endParaRPr lang="en-US" sz="1600" dirty="0"/>
+          </a:p>
+          <a:p>
+            <a:pPr>
+              <a:spcBef>
+                <a:spcPts val="300"/>
+              </a:spcBef>
+            </a:pPr>
+            <a:r>
+              <a:rPr lang="en-US" sz="1600" dirty="0"/>
+              <a:t>Augmented-by Addition into the IETF-YANG-Library</a:t>
+            </a:r>
+            <a:br>
+              <a:rPr lang="en-US" sz="1600" dirty="0"/>
+            </a:br>
+            <a:r>
+              <a:rPr lang="en-US" sz="1600" dirty="0">
+                <a:hlinkClick r:id="rId10"/>
+              </a:rPr>
+              <a:t>draft-</a:t>
+            </a:r>
+            <a:r>
+              <a:rPr lang="en-US" sz="1600" dirty="0" err="1">
+                <a:hlinkClick r:id="rId10"/>
+              </a:rPr>
+              <a:t>ietf</a:t>
+            </a:r>
+            <a:r>
+              <a:rPr lang="en-US" sz="1600" dirty="0">
+                <a:hlinkClick r:id="rId10"/>
+              </a:rPr>
+              <a:t>-netconf-yang-library-augmentation</a:t>
+            </a:r>
+            <a:endParaRPr lang="en-US" sz="1600" dirty="0"/>
+          </a:p>
+          <a:p>
+            <a:pPr marL="0" indent="0">
+              <a:spcBef>
+                <a:spcPts val="1200"/>
+              </a:spcBef>
+              <a:buFont typeface="Arial" panose="020B0604020202020204" pitchFamily="34" charset="0"/>
+              <a:buNone/>
+            </a:pPr>
+            <a:r>
+              <a:rPr lang="en-US" sz="1800" b="1" dirty="0"/>
+              <a:t>YANG-Push Simplification:</a:t>
+            </a:r>
+          </a:p>
+          <a:p>
+            <a:pPr>
+              <a:spcBef>
+                <a:spcPts val="300"/>
+              </a:spcBef>
+            </a:pPr>
+            <a:r>
+              <a:rPr lang="en-US" sz="1600" dirty="0"/>
+              <a:t>YANG-Push Operational Data Observability Enhancements</a:t>
+            </a:r>
+            <a:br>
+              <a:rPr lang="en-US" sz="1600" dirty="0"/>
+            </a:br>
+            <a:r>
+              <a:rPr lang="en-US" sz="1600" dirty="0">
+                <a:hlinkClick r:id="rId11"/>
+              </a:rPr>
+              <a:t>draft-</a:t>
+            </a:r>
+            <a:r>
+              <a:rPr lang="en-US" sz="1600" dirty="0" err="1">
+                <a:hlinkClick r:id="rId11"/>
+              </a:rPr>
+              <a:t>wilton</a:t>
+            </a:r>
+            <a:r>
+              <a:rPr lang="en-US" sz="1600" dirty="0">
+                <a:hlinkClick r:id="rId11"/>
+              </a:rPr>
+              <a:t>-netconf-</a:t>
+            </a:r>
+            <a:r>
+              <a:rPr lang="en-US" sz="1600" dirty="0" err="1">
+                <a:hlinkClick r:id="rId11"/>
+              </a:rPr>
+              <a:t>yp</a:t>
+            </a:r>
+            <a:r>
+              <a:rPr lang="en-US" sz="1600" dirty="0">
+                <a:hlinkClick r:id="rId11"/>
+              </a:rPr>
+              <a:t>-observability</a:t>
+            </a:r>
+            <a:endParaRPr lang="en-US" sz="1600" dirty="0"/>
+          </a:p>
+          <a:p>
+            <a:pPr marL="0" indent="0">
+              <a:spcBef>
+                <a:spcPts val="1200"/>
+              </a:spcBef>
+              <a:buNone/>
+            </a:pPr>
+            <a:r>
+              <a:rPr lang="en-US" sz="1800" b="1" dirty="0"/>
+              <a:t>YANG-Push Message Broker:</a:t>
+            </a:r>
+          </a:p>
+          <a:p>
+            <a:pPr>
+              <a:spcBef>
+                <a:spcPts val="300"/>
+              </a:spcBef>
+            </a:pPr>
+            <a:r>
+              <a:rPr lang="en-US" sz="1600" dirty="0"/>
+              <a:t>An Architecture for YANG-Push to Message Broker Integration</a:t>
+            </a:r>
+            <a:br>
+              <a:rPr lang="en-US" sz="1600" dirty="0"/>
+            </a:br>
+            <a:r>
+              <a:rPr lang="en-US" sz="1600" dirty="0">
+                <a:hlinkClick r:id="rId12"/>
+              </a:rPr>
+              <a:t>draft-</a:t>
+            </a:r>
+            <a:r>
+              <a:rPr lang="en-US" sz="1600" dirty="0" err="1">
+                <a:hlinkClick r:id="rId12"/>
+              </a:rPr>
+              <a:t>netana</a:t>
+            </a:r>
+            <a:r>
+              <a:rPr lang="en-US" sz="1600" dirty="0">
+                <a:hlinkClick r:id="rId12"/>
+              </a:rPr>
+              <a:t>-</a:t>
+            </a:r>
+            <a:r>
+              <a:rPr lang="en-US" sz="1600" dirty="0" err="1">
+                <a:hlinkClick r:id="rId12"/>
+              </a:rPr>
+              <a:t>nmop</a:t>
+            </a:r>
+            <a:r>
+              <a:rPr lang="en-US" sz="1600" dirty="0">
+                <a:hlinkClick r:id="rId12"/>
+              </a:rPr>
+              <a:t>-yang-message-broker-integration</a:t>
+            </a:r>
+            <a:endParaRPr lang="en-US" sz="1600" dirty="0"/>
+          </a:p>
+        </p:txBody>
+      </p:sp>
+      <p:pic>
+        <p:nvPicPr>
+          <p:cNvPr id="7" name="Picture 6">
+            <a:extLst>
+              <a:ext uri="{FF2B5EF4-FFF2-40B4-BE49-F238E27FC236}">
+                <a16:creationId xmlns:a16="http://schemas.microsoft.com/office/drawing/2014/main" id="{0A11DEF8-69C9-1E60-4EF8-A3E0E2EEFE5E}"/>
+              </a:ext>
+            </a:extLst>
+          </p:cNvPr>
+          <p:cNvPicPr>
+            <a:picLocks noChangeAspect="1"/>
+          </p:cNvPicPr>
+          <p:nvPr/>
+        </p:nvPicPr>
+        <p:blipFill>
+          <a:blip r:embed="rId13"/>
+          <a:stretch>
+            <a:fillRect/>
+          </a:stretch>
+        </p:blipFill>
+        <p:spPr>
+          <a:xfrm>
+            <a:off x="838198" y="5277116"/>
+            <a:ext cx="6103778" cy="1449646"/>
+          </a:xfrm>
+          <a:prstGeom prst="rect">
+            <a:avLst/>
+          </a:prstGeom>
+        </p:spPr>
+      </p:pic>
+      <p:sp>
+        <p:nvSpPr>
+          <p:cNvPr id="9" name="TextBox 8">
+            <a:extLst>
+              <a:ext uri="{FF2B5EF4-FFF2-40B4-BE49-F238E27FC236}">
+                <a16:creationId xmlns:a16="http://schemas.microsoft.com/office/drawing/2014/main" id="{76DFCB4A-5A26-3D89-003B-C1376E910ECB}"/>
+              </a:ext>
+            </a:extLst>
+          </p:cNvPr>
+          <p:cNvSpPr txBox="1"/>
+          <p:nvPr/>
+        </p:nvSpPr>
+        <p:spPr>
+          <a:xfrm>
+            <a:off x="1751823" y="4982646"/>
+            <a:ext cx="674137" cy="369332"/>
+          </a:xfrm>
+          <a:prstGeom prst="rect">
+            <a:avLst/>
+          </a:prstGeom>
+          <a:noFill/>
+        </p:spPr>
+        <p:txBody>
+          <a:bodyPr wrap="square">
+            <a:spAutoFit/>
+          </a:bodyPr>
+          <a:lstStyle/>
+          <a:p>
+            <a:r>
+              <a:rPr lang="en-US" sz="1800" b="1" dirty="0"/>
+              <a:t>2025</a:t>
+            </a:r>
+            <a:endParaRPr lang="de-CH" dirty="0"/>
+          </a:p>
+        </p:txBody>
+      </p:sp>
+      <p:sp>
+        <p:nvSpPr>
+          <p:cNvPr id="10" name="TextBox 9">
+            <a:extLst>
+              <a:ext uri="{FF2B5EF4-FFF2-40B4-BE49-F238E27FC236}">
+                <a16:creationId xmlns:a16="http://schemas.microsoft.com/office/drawing/2014/main" id="{AE56A713-7107-EBE1-2757-84C6A1F346F1}"/>
+              </a:ext>
+            </a:extLst>
+          </p:cNvPr>
+          <p:cNvSpPr txBox="1"/>
+          <p:nvPr/>
+        </p:nvSpPr>
+        <p:spPr>
+          <a:xfrm>
+            <a:off x="2746700" y="4982488"/>
+            <a:ext cx="674137" cy="369332"/>
+          </a:xfrm>
+          <a:prstGeom prst="rect">
+            <a:avLst/>
+          </a:prstGeom>
+          <a:noFill/>
+        </p:spPr>
+        <p:txBody>
+          <a:bodyPr wrap="square">
+            <a:spAutoFit/>
+          </a:bodyPr>
+          <a:lstStyle/>
+          <a:p>
+            <a:r>
+              <a:rPr lang="en-US" sz="1800" b="1" dirty="0"/>
+              <a:t>2026</a:t>
+            </a:r>
+            <a:endParaRPr lang="de-CH" dirty="0"/>
+          </a:p>
+        </p:txBody>
+      </p:sp>
+      <p:sp>
+        <p:nvSpPr>
+          <p:cNvPr id="11" name="TextBox 10">
+            <a:extLst>
+              <a:ext uri="{FF2B5EF4-FFF2-40B4-BE49-F238E27FC236}">
+                <a16:creationId xmlns:a16="http://schemas.microsoft.com/office/drawing/2014/main" id="{97CADFF5-A2FD-EA83-3DC3-27D9F2FE3688}"/>
+              </a:ext>
+            </a:extLst>
+          </p:cNvPr>
+          <p:cNvSpPr txBox="1"/>
+          <p:nvPr/>
+        </p:nvSpPr>
+        <p:spPr>
+          <a:xfrm>
+            <a:off x="4074780" y="4982488"/>
+            <a:ext cx="674137" cy="369332"/>
+          </a:xfrm>
+          <a:prstGeom prst="rect">
+            <a:avLst/>
+          </a:prstGeom>
+          <a:noFill/>
+        </p:spPr>
+        <p:txBody>
+          <a:bodyPr wrap="square">
+            <a:spAutoFit/>
+          </a:bodyPr>
+          <a:lstStyle/>
+          <a:p>
+            <a:r>
+              <a:rPr lang="en-US" sz="1800" b="1" dirty="0"/>
+              <a:t>2027</a:t>
+            </a:r>
+            <a:endParaRPr lang="de-CH" dirty="0"/>
+          </a:p>
+        </p:txBody>
+      </p:sp>
+      <p:sp>
+        <p:nvSpPr>
+          <p:cNvPr id="12" name="TextBox 11">
+            <a:extLst>
+              <a:ext uri="{FF2B5EF4-FFF2-40B4-BE49-F238E27FC236}">
+                <a16:creationId xmlns:a16="http://schemas.microsoft.com/office/drawing/2014/main" id="{80E2C7F2-70F7-2366-8405-DD8B496C3EF7}"/>
+              </a:ext>
+            </a:extLst>
+          </p:cNvPr>
+          <p:cNvSpPr txBox="1"/>
+          <p:nvPr/>
+        </p:nvSpPr>
+        <p:spPr>
+          <a:xfrm>
+            <a:off x="5468151" y="4983827"/>
+            <a:ext cx="674137" cy="369332"/>
+          </a:xfrm>
+          <a:prstGeom prst="rect">
+            <a:avLst/>
+          </a:prstGeom>
+          <a:noFill/>
+        </p:spPr>
+        <p:txBody>
+          <a:bodyPr wrap="square">
+            <a:spAutoFit/>
+          </a:bodyPr>
+          <a:lstStyle/>
+          <a:p>
+            <a:r>
+              <a:rPr lang="en-US" sz="1800" b="1" dirty="0"/>
+              <a:t>2028</a:t>
+            </a:r>
+            <a:endParaRPr lang="de-CH" dirty="0"/>
+          </a:p>
+        </p:txBody>
+      </p:sp>
+    </p:spTree>
+    <p:extLst>
+      <p:ext uri="{BB962C8B-B14F-4D97-AF65-F5344CB8AC3E}">
+        <p14:creationId xmlns:p14="http://schemas.microsoft.com/office/powerpoint/2010/main" val="3325836654"/>
+      </p:ext>
+    </p:extLst>
+  </p:cSld>
+  <p:clrMapOvr>
+    <a:masterClrMapping/>
+  </p:clrMapOvr>
+</p:sld>
+</file>
+
+<file path=ppt/slides/slide2.xml><?xml version="1.0" encoding="utf-8"?>
+<p:sld xmlns:a="http://schemas.openxmlformats.org/drawingml/2006/main" xmlns:r="http://schemas.openxmlformats.org/officeDocument/2006/relationships" xmlns:p="http://schemas.openxmlformats.org/presentationml/2006/main">
+  <p:cSld>
+    <p:spTree>
+      <p:nvGrpSpPr>
+        <p:cNvPr id="1" name=""/>
+        <p:cNvGrpSpPr/>
+        <p:nvPr/>
+      </p:nvGrpSpPr>
+      <p:grpSpPr>
+        <a:xfrm>
+          <a:off x="0" y="0"/>
+          <a:ext cx="0" cy="0"/>
+          <a:chOff x="0" y="0"/>
+          <a:chExt cx="0" cy="0"/>
+        </a:xfrm>
+      </p:grpSpPr>
+      <p:sp>
+        <p:nvSpPr>
           <p:cNvPr id="6" name="Slide Number Placeholder 1">
             <a:extLst>
               <a:ext uri="{FF2B5EF4-FFF2-40B4-BE49-F238E27FC236}">
@@ -4359,7 +5636,7 @@
           <a:p>
             <a:fld id="{FC4AC485-25DE-431E-B345-9C0A15BB7F8A}" type="slidenum">
               <a:rPr lang="de-CH" sz="1400" smtClean="0"/>
-              <a:t>1</a:t>
+              <a:t>2</a:t>
             </a:fld>
             <a:endParaRPr lang="de-CH" sz="1400" dirty="0"/>
           </a:p>
@@ -4796,7 +6073,7 @@
 </p:sld>
 </file>
 
-<file path=ppt/slides/slide2.xml><?xml version="1.0" encoding="utf-8"?>
+<file path=ppt/slides/slide3.xml><?xml version="1.0" encoding="utf-8"?>
 <p:sld xmlns:a="http://schemas.openxmlformats.org/drawingml/2006/main" xmlns:r="http://schemas.openxmlformats.org/officeDocument/2006/relationships" xmlns:p="http://schemas.openxmlformats.org/presentationml/2006/main">
   <p:cSld>
     <p:spTree>
@@ -5096,7 +6373,7 @@
           <a:p>
             <a:fld id="{FC4AC485-25DE-431E-B345-9C0A15BB7F8A}" type="slidenum">
               <a:rPr lang="de-CH" sz="1400" smtClean="0"/>
-              <a:t>2</a:t>
+              <a:t>3</a:t>
             </a:fld>
             <a:endParaRPr lang="de-CH" sz="1400" dirty="0"/>
           </a:p>
@@ -5115,7 +6392,7 @@
 </p:sld>
 </file>
 
-<file path=ppt/slides/slide3.xml><?xml version="1.0" encoding="utf-8"?>
+<file path=ppt/slides/slide4.xml><?xml version="1.0" encoding="utf-8"?>
 <p:sld xmlns:a="http://schemas.openxmlformats.org/drawingml/2006/main" xmlns:r="http://schemas.openxmlformats.org/officeDocument/2006/relationships" xmlns:p="http://schemas.openxmlformats.org/presentationml/2006/main">
   <p:cSld>
     <p:spTree>
@@ -5160,7 +6437,7 @@
           <a:p>
             <a:fld id="{FC4AC485-25DE-431E-B345-9C0A15BB7F8A}" type="slidenum">
               <a:rPr lang="de-CH" sz="1400" smtClean="0"/>
-              <a:t>3</a:t>
+              <a:t>4</a:t>
             </a:fld>
             <a:endParaRPr lang="de-CH" sz="1400" dirty="0"/>
           </a:p>
@@ -6139,7 +7416,7 @@
 </p:sld>
 </file>
 
-<file path=ppt/slides/slide4.xml><?xml version="1.0" encoding="utf-8"?>
+<file path=ppt/slides/slide5.xml><?xml version="1.0" encoding="utf-8"?>
 <p:sld xmlns:a="http://schemas.openxmlformats.org/drawingml/2006/main" xmlns:r="http://schemas.openxmlformats.org/officeDocument/2006/relationships" xmlns:p="http://schemas.openxmlformats.org/presentationml/2006/main">
   <p:cSld>
     <p:spTree>
@@ -6184,7 +7461,7 @@
           <a:p>
             <a:fld id="{FC4AC485-25DE-431E-B345-9C0A15BB7F8A}" type="slidenum">
               <a:rPr lang="de-CH" sz="1400" smtClean="0"/>
-              <a:t>4</a:t>
+              <a:t>5</a:t>
             </a:fld>
             <a:endParaRPr lang="de-CH" sz="1400" dirty="0"/>
           </a:p>
@@ -6724,7 +8001,7 @@
 </p:sld>
 </file>
 
-<file path=ppt/slides/slide5.xml><?xml version="1.0" encoding="utf-8"?>
+<file path=ppt/slides/slide6.xml><?xml version="1.0" encoding="utf-8"?>
 <p:sld xmlns:a="http://schemas.openxmlformats.org/drawingml/2006/main" xmlns:r="http://schemas.openxmlformats.org/officeDocument/2006/relationships" xmlns:p="http://schemas.openxmlformats.org/presentationml/2006/main">
   <p:cSld>
     <p:spTree>
@@ -6769,7 +8046,7 @@
           <a:p>
             <a:fld id="{FC4AC485-25DE-431E-B345-9C0A15BB7F8A}" type="slidenum">
               <a:rPr lang="de-CH" sz="1400" smtClean="0"/>
-              <a:t>5</a:t>
+              <a:t>6</a:t>
             </a:fld>
             <a:endParaRPr lang="de-CH" sz="1400" dirty="0"/>
           </a:p>
@@ -7178,8 +8455,16 @@
               <a:buChar char="•"/>
             </a:pPr>
             <a:r>
-              <a:rPr lang="en-US" dirty="0"/>
-              <a:t>Agile incremental driven development. Deployment guide describing implementers and operators what is/should be supported at which MVP stage. </a:t>
+              <a:rPr lang="en-US" b="1" dirty="0">
+                <a:solidFill>
+                  <a:srgbClr val="FF0000"/>
+                </a:solidFill>
+              </a:rPr>
+              <a:t>Agile incremental driven development. </a:t>
+            </a:r>
+            <a:r>
+              <a:rPr lang="en-US" b="1" dirty="0"/>
+              <a:t>Deployment guide describing implementers and operators what is/should be supported at which MVP stage. </a:t>
             </a:r>
           </a:p>
         </p:txBody>
@@ -7349,7 +8634,7 @@
 </p:sld>
 </file>
 
-<file path=ppt/slides/slide6.xml><?xml version="1.0" encoding="utf-8"?>
+<file path=ppt/slides/slide7.xml><?xml version="1.0" encoding="utf-8"?>
 <p:sld xmlns:a="http://schemas.openxmlformats.org/drawingml/2006/main" xmlns:r="http://schemas.openxmlformats.org/officeDocument/2006/relationships" xmlns:p="http://schemas.openxmlformats.org/presentationml/2006/main">
   <p:cSld>
     <p:spTree>
@@ -7394,7 +8679,7 @@
           <a:p>
             <a:fld id="{FC4AC485-25DE-431E-B345-9C0A15BB7F8A}" type="slidenum">
               <a:rPr lang="en-US" sz="1400" smtClean="0"/>
-              <a:t>6</a:t>
+              <a:t>7</a:t>
             </a:fld>
             <a:endParaRPr lang="en-US" sz="1400" dirty="0"/>
           </a:p>
@@ -7499,7 +8784,7 @@
         </p:nvCxnSpPr>
         <p:spPr bwMode="gray">
           <a:xfrm>
-            <a:off x="3534558" y="4074560"/>
+            <a:off x="3457387" y="4066688"/>
             <a:ext cx="2130515" cy="0"/>
           </a:xfrm>
           <a:prstGeom prst="line">
@@ -7552,7 +8837,7 @@
         </p:nvGrpSpPr>
         <p:grpSpPr bwMode="black">
           <a:xfrm>
-            <a:off x="268350" y="1690688"/>
+            <a:off x="576263" y="1690688"/>
             <a:ext cx="2736000" cy="2232000"/>
             <a:chOff x="1632000" y="1341000"/>
             <a:chExt cx="2232000" cy="2232000"/>
@@ -8122,15 +9407,15 @@
             </a:p>
             <a:p>
               <a:r>
-                <a:rPr lang="en-US" dirty="0"/>
+                <a:rPr lang="en-US" sz="1400" dirty="0"/>
                 <a:t>Defines operators' requirements in RFC 3535 to lifecycle CLI and SNMP. YANG, Netconf and </a:t>
               </a:r>
               <a:r>
-                <a:rPr lang="en-US" dirty="0" err="1"/>
+                <a:rPr lang="en-US" sz="1400" dirty="0" err="1"/>
                 <a:t>Restconf</a:t>
               </a:r>
               <a:r>
-                <a:rPr lang="en-US" dirty="0"/>
+                <a:rPr lang="en-US" sz="1400" dirty="0"/>
                 <a:t> development started.</a:t>
               </a:r>
             </a:p>
@@ -8151,7 +9436,7 @@
         </p:nvGrpSpPr>
         <p:grpSpPr bwMode="black">
           <a:xfrm>
-            <a:off x="4693298" y="1690688"/>
+            <a:off x="5001211" y="1690688"/>
             <a:ext cx="2251579" cy="2232000"/>
             <a:chOff x="1632000" y="1341000"/>
             <a:chExt cx="2232000" cy="2232000"/>
@@ -8722,11 +10007,11 @@
             </a:p>
             <a:p>
               <a:r>
-                <a:rPr lang="en-US" dirty="0" err="1"/>
+                <a:rPr lang="en-US" sz="1400" dirty="0" err="1"/>
                 <a:t>gNMI</a:t>
               </a:r>
               <a:r>
-                <a:rPr lang="en-US" dirty="0"/>
+                <a:rPr lang="en-US" sz="1400" dirty="0"/>
                 <a:t> was proposed to IETF NETCONF and implementations started at major network vendors.</a:t>
               </a:r>
             </a:p>
@@ -9325,7 +10610,7 @@
                 </a:spcAft>
               </a:pPr>
               <a:r>
-                <a:rPr lang="en-US" dirty="0"/>
+                <a:rPr lang="en-US" sz="1400" dirty="0"/>
                 <a:t>Vendor-specific implementations and IETF YANG-Push are hard to manage. New requirements emerged for integrating with the message broker and an automated data processing chain. New specifications are proposed to resolve these challenges.</a:t>
               </a:r>
             </a:p>
@@ -9916,7 +11201,7 @@
             </a:p>
             <a:p>
               <a:r>
-                <a:rPr lang="en-US" dirty="0"/>
+                <a:rPr lang="en-US" sz="1400" dirty="0"/>
                 <a:t>Development of RFC 8639 and RFC 8641 started at IETF NETCONF.</a:t>
               </a:r>
             </a:p>
@@ -10514,7 +11799,7 @@
             </a:p>
             <a:p>
               <a:r>
-                <a:rPr lang="en-US" dirty="0"/>
+                <a:rPr lang="en-US" sz="1400" dirty="0"/>
                 <a:t>Development of RFC 8639 and RFC 8641 concluded at IETF NETCONF without any major network vendor implementations.</a:t>
               </a:r>
             </a:p>
@@ -11112,7 +12397,7 @@
             </a:p>
             <a:p>
               <a:r>
-                <a:rPr lang="en-US" dirty="0"/>
+                <a:rPr lang="en-US" sz="1400" dirty="0"/>
                 <a:t>Questions arise. Proposing a simplified IETF YANG-Push and an Agile Incremental Driven Development.</a:t>
               </a:r>
             </a:p>
@@ -11133,7 +12418,7 @@
         </p:nvGrpSpPr>
         <p:grpSpPr bwMode="black">
           <a:xfrm>
-            <a:off x="3098944" y="1690687"/>
+            <a:off x="3406857" y="1690687"/>
             <a:ext cx="1273596" cy="2232000"/>
             <a:chOff x="1632000" y="1341000"/>
             <a:chExt cx="2232000" cy="2232000"/>
@@ -11703,13 +12988,13 @@
             </a:p>
             <a:p>
               <a:r>
-                <a:rPr lang="en-US" dirty="0"/>
+                <a:rPr lang="en-US" sz="1400" dirty="0"/>
                 <a:t>Specified in RFC 6020. 1.1 in RFC 7950.</a:t>
               </a:r>
               <a:br>
-                <a:rPr lang="en-US" dirty="0"/>
+                <a:rPr lang="en-US" sz="1400" dirty="0"/>
               </a:br>
-              <a:endParaRPr lang="en-US" dirty="0"/>
+              <a:endParaRPr lang="en-US" sz="1400" dirty="0"/>
             </a:p>
           </p:txBody>
         </p:sp>
@@ -11730,7 +13015,7 @@
         </p:nvCxnSpPr>
         <p:spPr bwMode="gray">
           <a:xfrm>
-            <a:off x="5030742" y="4074560"/>
+            <a:off x="5061899" y="4046568"/>
             <a:ext cx="2130515" cy="0"/>
           </a:xfrm>
           <a:prstGeom prst="line">
@@ -11785,7 +13070,7 @@
         </p:nvCxnSpPr>
         <p:spPr bwMode="gray">
           <a:xfrm>
-            <a:off x="6188267" y="4066688"/>
+            <a:off x="6406786" y="4066688"/>
             <a:ext cx="2130515" cy="0"/>
           </a:xfrm>
           <a:prstGeom prst="line">
@@ -11837,7 +13122,7 @@
 </p:sld>
 </file>
 
-<file path=ppt/slides/slide7.xml><?xml version="1.0" encoding="utf-8"?>
+<file path=ppt/slides/slide8.xml><?xml version="1.0" encoding="utf-8"?>
 <p:sld xmlns:a="http://schemas.openxmlformats.org/drawingml/2006/main" xmlns:r="http://schemas.openxmlformats.org/officeDocument/2006/relationships" xmlns:p="http://schemas.openxmlformats.org/presentationml/2006/main">
   <p:cSld>
     <p:spTree>
@@ -11882,7 +13167,7 @@
           <a:p>
             <a:fld id="{FC4AC485-25DE-431E-B345-9C0A15BB7F8A}" type="slidenum">
               <a:rPr lang="de-CH" sz="1400" smtClean="0"/>
-              <a:t>7</a:t>
+              <a:t>8</a:t>
             </a:fld>
             <a:endParaRPr lang="de-CH" sz="1400" dirty="0"/>
           </a:p>
@@ -12304,7 +13589,7 @@
 </p:sld>
 </file>
 
-<file path=ppt/slides/slide8.xml><?xml version="1.0" encoding="utf-8"?>
+<file path=ppt/slides/slide9.xml><?xml version="1.0" encoding="utf-8"?>
 <p:sld xmlns:a="http://schemas.openxmlformats.org/drawingml/2006/main" xmlns:r="http://schemas.openxmlformats.org/officeDocument/2006/relationships" xmlns:p="http://schemas.openxmlformats.org/presentationml/2006/main">
   <p:cSld>
     <p:spTree>
@@ -12323,357 +13608,10 @@
       </p:grpSpPr>
       <p:sp>
         <p:nvSpPr>
-          <p:cNvPr id="2" name="Title 1">
-            <a:extLst>
-              <a:ext uri="{FF2B5EF4-FFF2-40B4-BE49-F238E27FC236}">
-                <a16:creationId xmlns:a16="http://schemas.microsoft.com/office/drawing/2014/main" id="{FF20F271-6F0D-4AC0-BB1D-F5C338165C13}"/>
-              </a:ext>
-            </a:extLst>
-          </p:cNvPr>
-          <p:cNvSpPr>
-            <a:spLocks noGrp="1"/>
-          </p:cNvSpPr>
-          <p:nvPr>
-            <p:ph type="title"/>
-          </p:nvPr>
-        </p:nvSpPr>
-        <p:spPr/>
-        <p:txBody>
-          <a:bodyPr>
-            <a:normAutofit/>
-          </a:bodyPr>
-          <a:lstStyle/>
-          <a:p>
-            <a:r>
-              <a:rPr lang="en-US" sz="2800" b="1" dirty="0"/>
-              <a:t>Addressing YANG Specification and Integration Gaps</a:t>
-            </a:r>
-            <a:br>
-              <a:rPr lang="en-GB" sz="3600" dirty="0"/>
-            </a:br>
-            <a:r>
-              <a:rPr lang="en-US" sz="2700" dirty="0">
-                <a:solidFill>
-                  <a:schemeClr val="bg2">
-                    <a:lumMod val="75000"/>
-                  </a:schemeClr>
-                </a:solidFill>
-              </a:rPr>
-              <a:t>11 documents piling up at NETCONF, NETMOD and NMOP…</a:t>
-            </a:r>
-          </a:p>
-        </p:txBody>
-      </p:sp>
-      <p:sp>
-        <p:nvSpPr>
-          <p:cNvPr id="3" name="Content Placeholder 2">
-            <a:extLst>
-              <a:ext uri="{FF2B5EF4-FFF2-40B4-BE49-F238E27FC236}">
-                <a16:creationId xmlns:a16="http://schemas.microsoft.com/office/drawing/2014/main" id="{29C0DFD4-432D-4B0C-93DF-790441DCF5B9}"/>
-              </a:ext>
-            </a:extLst>
-          </p:cNvPr>
-          <p:cNvSpPr>
-            <a:spLocks noGrp="1"/>
-          </p:cNvSpPr>
-          <p:nvPr>
-            <p:ph idx="1"/>
-          </p:nvPr>
-        </p:nvSpPr>
-        <p:spPr>
-          <a:xfrm>
-            <a:off x="838199" y="1690688"/>
-            <a:ext cx="4732177" cy="4486275"/>
-          </a:xfrm>
-        </p:spPr>
-        <p:txBody>
-          <a:bodyPr>
-            <a:noAutofit/>
-          </a:bodyPr>
-          <a:lstStyle/>
-          <a:p>
-            <a:pPr marL="0" indent="0">
-              <a:buNone/>
-            </a:pPr>
-            <a:r>
-              <a:rPr lang="en-US" sz="1800" b="1" dirty="0"/>
-              <a:t>YANG-Push Transport Gaps:</a:t>
-            </a:r>
-            <a:endParaRPr lang="en-US" sz="1800" dirty="0"/>
-          </a:p>
-          <a:p>
-            <a:pPr>
-              <a:spcBef>
-                <a:spcPts val="300"/>
-              </a:spcBef>
-            </a:pPr>
-            <a:r>
-              <a:rPr lang="en-US" sz="1600" dirty="0"/>
-              <a:t>UDP-based Transport for Configured Subscriptions</a:t>
-            </a:r>
-            <a:br>
-              <a:rPr lang="en-US" sz="1600" dirty="0"/>
-            </a:br>
-            <a:r>
-              <a:rPr lang="en-US" sz="1600" dirty="0">
-                <a:hlinkClick r:id="rId3"/>
-              </a:rPr>
-              <a:t>draft-</a:t>
-            </a:r>
-            <a:r>
-              <a:rPr lang="en-US" sz="1600" dirty="0" err="1">
-                <a:hlinkClick r:id="rId3"/>
-              </a:rPr>
-              <a:t>ietf</a:t>
-            </a:r>
-            <a:r>
-              <a:rPr lang="en-US" sz="1600" dirty="0">
-                <a:hlinkClick r:id="rId3"/>
-              </a:rPr>
-              <a:t>-netconf-</a:t>
-            </a:r>
-            <a:r>
-              <a:rPr lang="en-US" sz="1600" dirty="0" err="1">
-                <a:hlinkClick r:id="rId3"/>
-              </a:rPr>
-              <a:t>udp</a:t>
-            </a:r>
-            <a:r>
-              <a:rPr lang="en-US" sz="1600" dirty="0">
-                <a:hlinkClick r:id="rId3"/>
-              </a:rPr>
-              <a:t>-</a:t>
-            </a:r>
-            <a:r>
-              <a:rPr lang="en-US" sz="1600" dirty="0" err="1">
-                <a:hlinkClick r:id="rId3"/>
-              </a:rPr>
-              <a:t>notif</a:t>
-            </a:r>
-            <a:endParaRPr lang="en-US" sz="1600" dirty="0"/>
-          </a:p>
-          <a:p>
-            <a:pPr>
-              <a:spcBef>
-                <a:spcPts val="300"/>
-              </a:spcBef>
-            </a:pPr>
-            <a:r>
-              <a:rPr lang="en-US" sz="1600" dirty="0"/>
-              <a:t>Subscription to Distributed Notifications</a:t>
-            </a:r>
-            <a:br>
-              <a:rPr lang="en-US" sz="1600" dirty="0"/>
-            </a:br>
-            <a:r>
-              <a:rPr lang="en-US" sz="1600" dirty="0">
-                <a:hlinkClick r:id="rId4"/>
-              </a:rPr>
-              <a:t>draft-</a:t>
-            </a:r>
-            <a:r>
-              <a:rPr lang="en-US" sz="1600" dirty="0" err="1">
-                <a:hlinkClick r:id="rId4"/>
-              </a:rPr>
-              <a:t>ietf</a:t>
-            </a:r>
-            <a:r>
-              <a:rPr lang="en-US" sz="1600" dirty="0">
-                <a:hlinkClick r:id="rId4"/>
-              </a:rPr>
-              <a:t>-netconf-distributed-</a:t>
-            </a:r>
-            <a:r>
-              <a:rPr lang="en-US" sz="1600" dirty="0" err="1">
-                <a:hlinkClick r:id="rId4"/>
-              </a:rPr>
-              <a:t>notif</a:t>
-            </a:r>
-            <a:endParaRPr lang="en-US" sz="1600" b="1" dirty="0"/>
-          </a:p>
-          <a:p>
-            <a:pPr marL="0" indent="0">
-              <a:buNone/>
-            </a:pPr>
-            <a:r>
-              <a:rPr lang="en-US" sz="1800" b="1" dirty="0"/>
-              <a:t>YANG-Push Specifications Gaps:</a:t>
-            </a:r>
-            <a:endParaRPr lang="en-US" sz="1800" dirty="0"/>
-          </a:p>
-          <a:p>
-            <a:pPr>
-              <a:spcBef>
-                <a:spcPts val="300"/>
-              </a:spcBef>
-            </a:pPr>
-            <a:r>
-              <a:rPr lang="en-US" sz="1600" dirty="0"/>
-              <a:t>Extensible YANG model for YANG-Push Notifications</a:t>
-            </a:r>
-            <a:br>
-              <a:rPr lang="en-US" sz="1600" dirty="0"/>
-            </a:br>
-            <a:r>
-              <a:rPr lang="en-US" sz="1600" dirty="0">
-                <a:ea typeface="Times New Roman" panose="02020603050405020304" pitchFamily="18" charset="0"/>
-                <a:hlinkClick r:id="rId5"/>
-              </a:rPr>
-              <a:t>draft-</a:t>
-            </a:r>
-            <a:r>
-              <a:rPr lang="en-US" sz="1600" dirty="0" err="1">
-                <a:ea typeface="Times New Roman" panose="02020603050405020304" pitchFamily="18" charset="0"/>
-                <a:hlinkClick r:id="rId5"/>
-              </a:rPr>
-              <a:t>netana</a:t>
-            </a:r>
-            <a:r>
-              <a:rPr lang="en-US" sz="1600" dirty="0">
-                <a:ea typeface="Times New Roman" panose="02020603050405020304" pitchFamily="18" charset="0"/>
-                <a:hlinkClick r:id="rId5"/>
-              </a:rPr>
-              <a:t>-netconf-</a:t>
-            </a:r>
-            <a:r>
-              <a:rPr lang="en-US" sz="1600" dirty="0" err="1">
-                <a:ea typeface="Times New Roman" panose="02020603050405020304" pitchFamily="18" charset="0"/>
-                <a:hlinkClick r:id="rId5"/>
-              </a:rPr>
-              <a:t>notif</a:t>
-            </a:r>
-            <a:r>
-              <a:rPr lang="en-US" sz="1600" dirty="0">
-                <a:ea typeface="Times New Roman" panose="02020603050405020304" pitchFamily="18" charset="0"/>
-                <a:hlinkClick r:id="rId5"/>
-              </a:rPr>
-              <a:t>-envelope</a:t>
-            </a:r>
-            <a:endParaRPr lang="en-US" sz="1600" dirty="0">
-              <a:ea typeface="Times New Roman" panose="02020603050405020304" pitchFamily="18" charset="0"/>
-            </a:endParaRPr>
-          </a:p>
-          <a:p>
-            <a:pPr>
-              <a:spcBef>
-                <a:spcPts val="300"/>
-              </a:spcBef>
-            </a:pPr>
-            <a:r>
-              <a:rPr lang="en-US" sz="1600" dirty="0">
-                <a:ea typeface="Times New Roman" panose="02020603050405020304" pitchFamily="18" charset="0"/>
-              </a:rPr>
-              <a:t>YANG Notification Transport Capabilities</a:t>
-            </a:r>
-            <a:br>
-              <a:rPr lang="en-US" sz="1600" dirty="0">
-                <a:ea typeface="Times New Roman" panose="02020603050405020304" pitchFamily="18" charset="0"/>
-              </a:rPr>
-            </a:br>
-            <a:r>
-              <a:rPr lang="en-US" sz="1600" dirty="0">
-                <a:ea typeface="Times New Roman" panose="02020603050405020304" pitchFamily="18" charset="0"/>
-                <a:hlinkClick r:id="rId6"/>
-              </a:rPr>
-              <a:t>draft-</a:t>
-            </a:r>
-            <a:r>
-              <a:rPr lang="en-US" sz="1600" dirty="0" err="1">
-                <a:ea typeface="Times New Roman" panose="02020603050405020304" pitchFamily="18" charset="0"/>
-                <a:hlinkClick r:id="rId6"/>
-              </a:rPr>
-              <a:t>netana</a:t>
-            </a:r>
-            <a:r>
-              <a:rPr lang="en-US" sz="1600" dirty="0">
-                <a:ea typeface="Times New Roman" panose="02020603050405020304" pitchFamily="18" charset="0"/>
-                <a:hlinkClick r:id="rId6"/>
-              </a:rPr>
-              <a:t>-netconf-</a:t>
-            </a:r>
-            <a:r>
-              <a:rPr lang="en-US" sz="1600" dirty="0" err="1">
-                <a:ea typeface="Times New Roman" panose="02020603050405020304" pitchFamily="18" charset="0"/>
-                <a:hlinkClick r:id="rId6"/>
-              </a:rPr>
-              <a:t>yp</a:t>
-            </a:r>
-            <a:r>
-              <a:rPr lang="en-US" sz="1600" dirty="0">
-                <a:ea typeface="Times New Roman" panose="02020603050405020304" pitchFamily="18" charset="0"/>
-                <a:hlinkClick r:id="rId6"/>
-              </a:rPr>
-              <a:t>-transport-capabilities</a:t>
-            </a:r>
-            <a:endParaRPr lang="en-US" sz="1600" dirty="0">
-              <a:ea typeface="Times New Roman" panose="02020603050405020304" pitchFamily="18" charset="0"/>
-            </a:endParaRPr>
-          </a:p>
-          <a:p>
-            <a:pPr>
-              <a:spcBef>
-                <a:spcPts val="300"/>
-              </a:spcBef>
-            </a:pPr>
-            <a:r>
-              <a:rPr lang="en-US" sz="1600" dirty="0"/>
-              <a:t>Validating </a:t>
-            </a:r>
-            <a:r>
-              <a:rPr lang="en-US" sz="1600" dirty="0" err="1"/>
-              <a:t>anydata</a:t>
-            </a:r>
-            <a:r>
-              <a:rPr lang="en-US" sz="1600" dirty="0"/>
-              <a:t> in YANG Library context</a:t>
-            </a:r>
-            <a:br>
-              <a:rPr lang="en-US" sz="1600" dirty="0"/>
-            </a:br>
-            <a:r>
-              <a:rPr lang="en-US" sz="1600" dirty="0">
-                <a:hlinkClick r:id="rId7"/>
-              </a:rPr>
-              <a:t>draft-</a:t>
-            </a:r>
-            <a:r>
-              <a:rPr lang="en-US" sz="1600" dirty="0" err="1">
-                <a:hlinkClick r:id="rId7"/>
-              </a:rPr>
-              <a:t>aelhassany</a:t>
-            </a:r>
-            <a:r>
-              <a:rPr lang="en-US" sz="1600" dirty="0">
-                <a:hlinkClick r:id="rId7"/>
-              </a:rPr>
-              <a:t>-</a:t>
-            </a:r>
-            <a:r>
-              <a:rPr lang="en-US" sz="1600" dirty="0" err="1">
-                <a:hlinkClick r:id="rId7"/>
-              </a:rPr>
-              <a:t>anydata</a:t>
-            </a:r>
-            <a:r>
-              <a:rPr lang="en-US" sz="1600" dirty="0">
-                <a:hlinkClick r:id="rId7"/>
-              </a:rPr>
-              <a:t>-validation</a:t>
-            </a:r>
-            <a:endParaRPr lang="en-US" sz="1600" b="1" dirty="0">
-              <a:solidFill>
-                <a:srgbClr val="FF0000"/>
-              </a:solidFill>
-            </a:endParaRPr>
-          </a:p>
-        </p:txBody>
-      </p:sp>
-      <p:sp>
-        <p:nvSpPr>
           <p:cNvPr id="6" name="Slide Number Placeholder 1">
             <a:extLst>
               <a:ext uri="{FF2B5EF4-FFF2-40B4-BE49-F238E27FC236}">
-                <a16:creationId xmlns:a16="http://schemas.microsoft.com/office/drawing/2014/main" id="{3D5EE238-429C-4784-8E42-1813EF45704D}"/>
+                <a16:creationId xmlns:a16="http://schemas.microsoft.com/office/drawing/2014/main" id="{024DC3B6-499C-4E15-9336-2F15A0DFB843}"/>
               </a:ext>
             </a:extLst>
           </p:cNvPr>
@@ -12696,7 +13634,7 @@
           <a:p>
             <a:fld id="{FC4AC485-25DE-431E-B345-9C0A15BB7F8A}" type="slidenum">
               <a:rPr lang="de-CH" sz="1400" smtClean="0"/>
-              <a:t>8</a:t>
+              <a:t>9</a:t>
             </a:fld>
             <a:endParaRPr lang="de-CH" sz="1400" dirty="0"/>
           </a:p>
@@ -12704,10 +13642,10 @@
       </p:sp>
       <p:sp>
         <p:nvSpPr>
-          <p:cNvPr id="4" name="Content Placeholder 2">
+          <p:cNvPr id="5" name="Inhaltsplatzhalter 2">
             <a:extLst>
               <a:ext uri="{FF2B5EF4-FFF2-40B4-BE49-F238E27FC236}">
-                <a16:creationId xmlns:a16="http://schemas.microsoft.com/office/drawing/2014/main" id="{847B953C-E781-5A94-33AD-E38789C4C7F0}"/>
+                <a16:creationId xmlns:a16="http://schemas.microsoft.com/office/drawing/2014/main" id="{0194B37B-813A-99FE-7B78-4D87D8C30D44}"/>
               </a:ext>
             </a:extLst>
           </p:cNvPr>
@@ -12716,30 +13654,31 @@
           </p:cNvSpPr>
           <p:nvPr/>
         </p:nvSpPr>
-        <p:spPr>
+        <p:spPr bwMode="black">
           <a:xfrm>
-            <a:off x="5946711" y="1690688"/>
-            <a:ext cx="6245289" cy="3366504"/>
+            <a:off x="961053" y="1884784"/>
+            <a:ext cx="10626840" cy="1866122"/>
           </a:xfrm>
           <a:prstGeom prst="rect">
             <a:avLst/>
           </a:prstGeom>
         </p:spPr>
         <p:txBody>
-          <a:bodyPr vert="horz" lIns="91440" tIns="45720" rIns="91440" bIns="45720" rtlCol="0">
-            <a:noAutofit/>
-          </a:bodyPr>
+          <a:bodyPr wrap="square" lIns="0" tIns="0" rIns="0" bIns="0"/>
           <a:lstStyle>
-            <a:lvl1pPr marL="228600" indent="-228600" algn="l" defTabSz="914400" rtl="0" eaLnBrk="1" latinLnBrk="0" hangingPunct="1">
+            <a:lvl1pPr marL="0" indent="0" algn="l" defTabSz="914400" rtl="0" eaLnBrk="1" latinLnBrk="0" hangingPunct="1">
               <a:lnSpc>
-                <a:spcPct val="90000"/>
+                <a:spcPct val="110000"/>
               </a:lnSpc>
               <a:spcBef>
-                <a:spcPts val="1000"/>
+                <a:spcPts val="600"/>
               </a:spcBef>
+              <a:spcAft>
+                <a:spcPts val="600"/>
+              </a:spcAft>
               <a:buFont typeface="Arial" panose="020B0604020202020204" pitchFamily="34" charset="0"/>
-              <a:buChar char="•"/>
-              <a:defRPr sz="2800" kern="1200">
+              <a:buNone/>
+              <a:defRPr sz="2000" b="0" kern="1200">
                 <a:solidFill>
                   <a:schemeClr val="tx1"/>
                 </a:solidFill>
@@ -12748,31 +13687,16 @@
                 <a:cs typeface="+mn-cs"/>
               </a:defRPr>
             </a:lvl1pPr>
-            <a:lvl2pPr marL="685800" indent="-228600" algn="l" defTabSz="914400" rtl="0" eaLnBrk="1" latinLnBrk="0" hangingPunct="1">
+            <a:lvl2pPr marL="216000" indent="-216000" algn="l" defTabSz="914400" rtl="0" eaLnBrk="1" latinLnBrk="0" hangingPunct="1">
               <a:lnSpc>
-                <a:spcPct val="90000"/>
+                <a:spcPct val="110000"/>
               </a:lnSpc>
               <a:spcBef>
-                <a:spcPts val="500"/>
+                <a:spcPts val="200"/>
               </a:spcBef>
-              <a:buFont typeface="Arial" panose="020B0604020202020204" pitchFamily="34" charset="0"/>
-              <a:buChar char="•"/>
-              <a:defRPr sz="2400" kern="1200">
-                <a:solidFill>
-                  <a:schemeClr val="tx1"/>
-                </a:solidFill>
-                <a:latin typeface="+mn-lt"/>
-                <a:ea typeface="+mn-ea"/>
-                <a:cs typeface="+mn-cs"/>
-              </a:defRPr>
-            </a:lvl2pPr>
-            <a:lvl3pPr marL="1143000" indent="-228600" algn="l" defTabSz="914400" rtl="0" eaLnBrk="1" latinLnBrk="0" hangingPunct="1">
-              <a:lnSpc>
-                <a:spcPct val="90000"/>
-              </a:lnSpc>
-              <a:spcBef>
-                <a:spcPts val="500"/>
-              </a:spcBef>
+              <a:spcAft>
+                <a:spcPts val="200"/>
+              </a:spcAft>
               <a:buFont typeface="Arial" panose="020B0604020202020204" pitchFamily="34" charset="0"/>
               <a:buChar char="•"/>
               <a:defRPr sz="2000" kern="1200">
@@ -12783,17 +13707,41 @@
                 <a:ea typeface="+mn-ea"/>
                 <a:cs typeface="+mn-cs"/>
               </a:defRPr>
-            </a:lvl3pPr>
-            <a:lvl4pPr marL="1600200" indent="-228600" algn="l" defTabSz="914400" rtl="0" eaLnBrk="1" latinLnBrk="0" hangingPunct="1">
+            </a:lvl2pPr>
+            <a:lvl3pPr marL="504000" indent="-288000" algn="l" defTabSz="914400" rtl="0" eaLnBrk="1" latinLnBrk="0" hangingPunct="1">
               <a:lnSpc>
-                <a:spcPct val="90000"/>
+                <a:spcPct val="110000"/>
               </a:lnSpc>
               <a:spcBef>
-                <a:spcPts val="500"/>
+                <a:spcPts val="200"/>
               </a:spcBef>
-              <a:buFont typeface="Arial" panose="020B0604020202020204" pitchFamily="34" charset="0"/>
-              <a:buChar char="•"/>
-              <a:defRPr sz="1800" kern="1200">
+              <a:spcAft>
+                <a:spcPts val="200"/>
+              </a:spcAft>
+              <a:buFont typeface="TheSans Swisscom Light" panose="020B0300040303060204" pitchFamily="34" charset="0"/>
+              <a:buChar char="−"/>
+              <a:defRPr sz="2000" kern="1200">
+                <a:solidFill>
+                  <a:schemeClr val="tx1"/>
+                </a:solidFill>
+                <a:latin typeface="+mn-lt"/>
+                <a:ea typeface="+mn-ea"/>
+                <a:cs typeface="+mn-cs"/>
+              </a:defRPr>
+            </a:lvl3pPr>
+            <a:lvl4pPr marL="792000" indent="-288000" algn="l" defTabSz="914400" rtl="0" eaLnBrk="1" latinLnBrk="0" hangingPunct="1">
+              <a:lnSpc>
+                <a:spcPct val="110000"/>
+              </a:lnSpc>
+              <a:spcBef>
+                <a:spcPts val="200"/>
+              </a:spcBef>
+              <a:spcAft>
+                <a:spcPts val="200"/>
+              </a:spcAft>
+              <a:buFont typeface="TheSans Swisscom Light" panose="020B0300040303060204" pitchFamily="34" charset="0"/>
+              <a:buChar char="−"/>
+              <a:defRPr sz="2000" kern="1200">
                 <a:solidFill>
                   <a:schemeClr val="tx1"/>
                 </a:solidFill>
@@ -12802,16 +13750,19 @@
                 <a:cs typeface="+mn-cs"/>
               </a:defRPr>
             </a:lvl4pPr>
-            <a:lvl5pPr marL="2057400" indent="-228600" algn="l" defTabSz="914400" rtl="0" eaLnBrk="1" latinLnBrk="0" hangingPunct="1">
+            <a:lvl5pPr marL="792000" indent="-288000" algn="l" defTabSz="914400" rtl="0" eaLnBrk="1" latinLnBrk="0" hangingPunct="1">
               <a:lnSpc>
-                <a:spcPct val="90000"/>
+                <a:spcPct val="110000"/>
               </a:lnSpc>
               <a:spcBef>
-                <a:spcPts val="500"/>
+                <a:spcPts val="200"/>
               </a:spcBef>
-              <a:buFont typeface="Arial" panose="020B0604020202020204" pitchFamily="34" charset="0"/>
-              <a:buChar char="•"/>
-              <a:defRPr sz="1800" kern="1200">
+              <a:spcAft>
+                <a:spcPts val="200"/>
+              </a:spcAft>
+              <a:buFont typeface="TheSans Swisscom Light" panose="020B0300040303060204" pitchFamily="34" charset="0"/>
+              <a:buChar char="−"/>
+              <a:defRPr sz="2000" kern="1200">
                 <a:solidFill>
                   <a:schemeClr val="tx1"/>
                 </a:solidFill>
@@ -12820,16 +13771,19 @@
                 <a:cs typeface="+mn-cs"/>
               </a:defRPr>
             </a:lvl5pPr>
-            <a:lvl6pPr marL="2514600" indent="-228600" algn="l" defTabSz="914400" rtl="0" eaLnBrk="1" latinLnBrk="0" hangingPunct="1">
+            <a:lvl6pPr marL="792000" indent="-288000" algn="l" defTabSz="914400" rtl="0" eaLnBrk="1" latinLnBrk="0" hangingPunct="1">
               <a:lnSpc>
-                <a:spcPct val="90000"/>
+                <a:spcPct val="110000"/>
               </a:lnSpc>
               <a:spcBef>
-                <a:spcPts val="500"/>
+                <a:spcPts val="200"/>
               </a:spcBef>
-              <a:buFont typeface="Arial" panose="020B0604020202020204" pitchFamily="34" charset="0"/>
-              <a:buChar char="•"/>
-              <a:defRPr sz="1800" kern="1200">
+              <a:spcAft>
+                <a:spcPts val="200"/>
+              </a:spcAft>
+              <a:buFont typeface="TheSans Swisscom Light" panose="020B0300040303060204" pitchFamily="34" charset="0"/>
+              <a:buChar char="−"/>
+              <a:defRPr sz="2000" kern="1200">
                 <a:solidFill>
                   <a:schemeClr val="tx1"/>
                 </a:solidFill>
@@ -12838,16 +13792,19 @@
                 <a:cs typeface="+mn-cs"/>
               </a:defRPr>
             </a:lvl6pPr>
-            <a:lvl7pPr marL="2971800" indent="-228600" algn="l" defTabSz="914400" rtl="0" eaLnBrk="1" latinLnBrk="0" hangingPunct="1">
+            <a:lvl7pPr marL="792000" indent="-288000" algn="l" defTabSz="914400" rtl="0" eaLnBrk="1" latinLnBrk="0" hangingPunct="1">
               <a:lnSpc>
-                <a:spcPct val="90000"/>
+                <a:spcPct val="110000"/>
               </a:lnSpc>
               <a:spcBef>
-                <a:spcPts val="500"/>
+                <a:spcPts val="200"/>
               </a:spcBef>
-              <a:buFont typeface="Arial" panose="020B0604020202020204" pitchFamily="34" charset="0"/>
-              <a:buChar char="•"/>
-              <a:defRPr sz="1800" kern="1200">
+              <a:spcAft>
+                <a:spcPts val="200"/>
+              </a:spcAft>
+              <a:buFont typeface="TheSans Swisscom Light" panose="020B0300040303060204" pitchFamily="34" charset="0"/>
+              <a:buChar char="−"/>
+              <a:defRPr sz="2000" kern="1200">
                 <a:solidFill>
                   <a:schemeClr val="tx1"/>
                 </a:solidFill>
@@ -12856,16 +13813,19 @@
                 <a:cs typeface="+mn-cs"/>
               </a:defRPr>
             </a:lvl7pPr>
-            <a:lvl8pPr marL="3429000" indent="-228600" algn="l" defTabSz="914400" rtl="0" eaLnBrk="1" latinLnBrk="0" hangingPunct="1">
+            <a:lvl8pPr marL="792000" indent="-288000" algn="l" defTabSz="914400" rtl="0" eaLnBrk="1" latinLnBrk="0" hangingPunct="1">
               <a:lnSpc>
-                <a:spcPct val="90000"/>
+                <a:spcPct val="110000"/>
               </a:lnSpc>
               <a:spcBef>
-                <a:spcPts val="500"/>
+                <a:spcPts val="200"/>
               </a:spcBef>
-              <a:buFont typeface="Arial" panose="020B0604020202020204" pitchFamily="34" charset="0"/>
-              <a:buChar char="•"/>
-              <a:defRPr sz="1800" kern="1200">
+              <a:spcAft>
+                <a:spcPts val="200"/>
+              </a:spcAft>
+              <a:buFont typeface="TheSans Swisscom Light" panose="020B0300040303060204" pitchFamily="34" charset="0"/>
+              <a:buChar char="−"/>
+              <a:defRPr sz="2000" kern="1200">
                 <a:solidFill>
                   <a:schemeClr val="tx1"/>
                 </a:solidFill>
@@ -12874,16 +13834,19 @@
                 <a:cs typeface="+mn-cs"/>
               </a:defRPr>
             </a:lvl8pPr>
-            <a:lvl9pPr marL="3886200" indent="-228600" algn="l" defTabSz="914400" rtl="0" eaLnBrk="1" latinLnBrk="0" hangingPunct="1">
+            <a:lvl9pPr marL="792000" indent="-288000" algn="l" defTabSz="914400" rtl="0" eaLnBrk="1" latinLnBrk="0" hangingPunct="1">
               <a:lnSpc>
-                <a:spcPct val="90000"/>
+                <a:spcPct val="110000"/>
               </a:lnSpc>
               <a:spcBef>
-                <a:spcPts val="500"/>
+                <a:spcPts val="200"/>
               </a:spcBef>
-              <a:buFont typeface="Arial" panose="020B0604020202020204" pitchFamily="34" charset="0"/>
-              <a:buChar char="•"/>
-              <a:defRPr sz="1800" kern="1200">
+              <a:spcAft>
+                <a:spcPts val="200"/>
+              </a:spcAft>
+              <a:buFont typeface="TheSans Swisscom Light" panose="020B0300040303060204" pitchFamily="34" charset="0"/>
+              <a:buChar char="−"/>
+              <a:defRPr sz="2000" kern="1200">
                 <a:solidFill>
                   <a:schemeClr val="tx1"/>
                 </a:solidFill>
@@ -12894,295 +13857,224 @@
             </a:lvl9pPr>
           </a:lstStyle>
           <a:p>
-            <a:pPr marL="0" indent="0">
+            <a:pPr marL="342900" marR="0" lvl="0" indent="-342900">
+              <a:lnSpc>
+                <a:spcPct val="107000"/>
+              </a:lnSpc>
               <a:spcBef>
-                <a:spcPts val="1200"/>
+                <a:spcPts val="0"/>
               </a:spcBef>
-              <a:buFont typeface="Arial" panose="020B0604020202020204" pitchFamily="34" charset="0"/>
-              <a:buNone/>
+              <a:spcAft>
+                <a:spcPts val="0"/>
+              </a:spcAft>
+              <a:buFont typeface="Wingdings" panose="05000000000000000000" pitchFamily="2" charset="2"/>
+              <a:buChar char="Ø"/>
             </a:pPr>
             <a:r>
-              <a:rPr lang="en-US" sz="1800" b="1" dirty="0"/>
-              <a:t>YANG-Push Integration Gaps and Arch:</a:t>
-            </a:r>
-          </a:p>
-          <a:p>
-            <a:pPr>
+              <a:rPr lang="en-US" dirty="0">
+                <a:solidFill>
+                  <a:srgbClr val="FF0000"/>
+                </a:solidFill>
+              </a:rPr>
+              <a:t>User first. No requirements without use cases.</a:t>
+            </a:r>
+            <a:endParaRPr lang="de-CH" dirty="0">
+              <a:solidFill>
+                <a:srgbClr val="FF0000"/>
+              </a:solidFill>
+            </a:endParaRPr>
+          </a:p>
+          <a:p>
+            <a:pPr marL="342900" marR="0" lvl="0" indent="-342900">
+              <a:lnSpc>
+                <a:spcPct val="107000"/>
+              </a:lnSpc>
               <a:spcBef>
-                <a:spcPts val="300"/>
+                <a:spcPts val="0"/>
               </a:spcBef>
+              <a:spcAft>
+                <a:spcPts val="0"/>
+              </a:spcAft>
+              <a:buFont typeface="Wingdings" panose="05000000000000000000" pitchFamily="2" charset="2"/>
+              <a:buChar char="Ø"/>
             </a:pPr>
             <a:r>
-              <a:rPr lang="en-US" sz="1600" dirty="0"/>
-              <a:t>Support of Network Observation Timestamping in YANG Notifications</a:t>
-            </a:r>
-            <a:br>
-              <a:rPr lang="en-US" sz="1600" dirty="0"/>
-            </a:br>
-            <a:r>
-              <a:rPr lang="en-US" sz="1600" dirty="0">
-                <a:hlinkClick r:id="rId8"/>
+              <a:rPr lang="en-US" dirty="0"/>
+              <a:t>Be dependable and predictable. Deliver </a:t>
+            </a:r>
+            <a:r>
+              <a:rPr lang="en-US" dirty="0">
+                <a:solidFill>
+                  <a:srgbClr val="FF0000"/>
+                </a:solidFill>
               </a:rPr>
-              <a:t>draft-</a:t>
-            </a:r>
-            <a:r>
-              <a:rPr lang="en-US" sz="1600" dirty="0" err="1">
-                <a:hlinkClick r:id="rId8"/>
+              <a:t>scoped items in time </a:t>
+            </a:r>
+            <a:r>
+              <a:rPr lang="en-US" dirty="0"/>
+              <a:t>with </a:t>
+            </a:r>
+            <a:r>
+              <a:rPr lang="en-US" dirty="0">
+                <a:solidFill>
+                  <a:srgbClr val="FF0000"/>
+                </a:solidFill>
               </a:rPr>
-              <a:t>tgraf</a:t>
-            </a:r>
-            <a:r>
-              <a:rPr lang="en-US" sz="1600" dirty="0">
-                <a:hlinkClick r:id="rId8"/>
+              <a:t>proven implementations.</a:t>
+            </a:r>
+            <a:endParaRPr lang="de-CH" dirty="0">
+              <a:solidFill>
+                <a:srgbClr val="FF0000"/>
+              </a:solidFill>
+            </a:endParaRPr>
+          </a:p>
+          <a:p>
+            <a:pPr marL="342900" marR="0" lvl="0" indent="-342900">
+              <a:lnSpc>
+                <a:spcPct val="107000"/>
+              </a:lnSpc>
+              <a:spcBef>
+                <a:spcPts val="0"/>
+              </a:spcBef>
+              <a:spcAft>
+                <a:spcPts val="0"/>
+              </a:spcAft>
+              <a:buFont typeface="Wingdings" panose="05000000000000000000" pitchFamily="2" charset="2"/>
+              <a:buChar char="Ø"/>
+            </a:pPr>
+            <a:r>
+              <a:rPr lang="en-US" dirty="0">
+                <a:solidFill>
+                  <a:srgbClr val="FF0000"/>
+                </a:solidFill>
               </a:rPr>
-              <a:t>-netconf-yang-push-observation-time</a:t>
-            </a:r>
-            <a:endParaRPr lang="en-US" sz="1600" dirty="0"/>
-          </a:p>
-          <a:p>
-            <a:pPr>
+              <a:t>Assess outcome </a:t>
+            </a:r>
+            <a:r>
+              <a:rPr lang="en-US" dirty="0"/>
+              <a:t>of minimal viable product (MVP) development </a:t>
+            </a:r>
+            <a:r>
+              <a:rPr lang="en-US" dirty="0">
+                <a:solidFill>
+                  <a:srgbClr val="FF0000"/>
+                </a:solidFill>
+              </a:rPr>
+              <a:t>before moving to the next</a:t>
+            </a:r>
+            <a:r>
+              <a:rPr lang="en-US" dirty="0"/>
+              <a:t>.</a:t>
+            </a:r>
+            <a:endParaRPr lang="de-CH" dirty="0"/>
+          </a:p>
+          <a:p>
+            <a:pPr marL="342900" marR="0" lvl="0" indent="-342900">
+              <a:lnSpc>
+                <a:spcPct val="107000"/>
+              </a:lnSpc>
               <a:spcBef>
-                <a:spcPts val="300"/>
+                <a:spcPts val="0"/>
               </a:spcBef>
+              <a:spcAft>
+                <a:spcPts val="800"/>
+              </a:spcAft>
+              <a:buFont typeface="Wingdings" panose="05000000000000000000" pitchFamily="2" charset="2"/>
+              <a:buChar char="Ø"/>
             </a:pPr>
             <a:r>
-              <a:rPr lang="en-US" sz="1600" dirty="0"/>
-              <a:t>Support of Versioning in YANG Notifications Subscription</a:t>
-            </a:r>
-            <a:br>
-              <a:rPr lang="en-US" sz="1600" dirty="0"/>
-            </a:br>
-            <a:r>
-              <a:rPr lang="en-US" sz="1600" dirty="0">
-                <a:hlinkClick r:id="rId9"/>
+              <a:rPr lang="en-US" dirty="0"/>
+              <a:t>In 12 months, from one MVP to another. End of 2025, IETF YANG-Push MVP 1 is in production. End of 2026 MVP 2. End of 2027 MVP 3.  The goal here is to </a:t>
+            </a:r>
+            <a:r>
+              <a:rPr lang="en-US" dirty="0">
+                <a:solidFill>
+                  <a:srgbClr val="FF0000"/>
+                </a:solidFill>
               </a:rPr>
-              <a:t>draft-</a:t>
-            </a:r>
-            <a:r>
-              <a:rPr lang="en-US" sz="1600" dirty="0" err="1">
-                <a:hlinkClick r:id="rId9"/>
-              </a:rPr>
-              <a:t>ietf</a:t>
-            </a:r>
-            <a:r>
-              <a:rPr lang="en-US" sz="1600" dirty="0">
-                <a:hlinkClick r:id="rId9"/>
-              </a:rPr>
-              <a:t>-netconf-yang-notifications-versioning</a:t>
-            </a:r>
-            <a:endParaRPr lang="en-US" sz="1600" dirty="0"/>
-          </a:p>
-          <a:p>
-            <a:pPr>
+              <a:t>strike the right balance between stability of IETF specifications and solutions</a:t>
+            </a:r>
+            <a:r>
+              <a:rPr lang="en-US" dirty="0"/>
+              <a:t>, and the very agile, move fast and break things solutions popular in other development spheres.</a:t>
+            </a:r>
+          </a:p>
+          <a:p>
+            <a:pPr marR="0" lvl="0">
+              <a:lnSpc>
+                <a:spcPct val="107000"/>
+              </a:lnSpc>
               <a:spcBef>
-                <a:spcPts val="300"/>
+                <a:spcPts val="1800"/>
               </a:spcBef>
+              <a:spcAft>
+                <a:spcPts val="800"/>
+              </a:spcAft>
             </a:pPr>
             <a:r>
-              <a:rPr lang="en-US" sz="1600" dirty="0"/>
-              <a:t>Augmented-by Addition into the IETF-YANG-Library</a:t>
-            </a:r>
-            <a:br>
-              <a:rPr lang="en-US" sz="1600" dirty="0"/>
-            </a:br>
-            <a:r>
-              <a:rPr lang="en-US" sz="1600" dirty="0">
-                <a:hlinkClick r:id="rId10"/>
-              </a:rPr>
-              <a:t>draft-</a:t>
-            </a:r>
-            <a:r>
-              <a:rPr lang="en-US" sz="1600" dirty="0" err="1">
-                <a:hlinkClick r:id="rId10"/>
-              </a:rPr>
-              <a:t>ietf</a:t>
-            </a:r>
-            <a:r>
-              <a:rPr lang="en-US" sz="1600" dirty="0">
-                <a:hlinkClick r:id="rId10"/>
-              </a:rPr>
-              <a:t>-netconf-yang-library-augmentation</a:t>
-            </a:r>
-            <a:endParaRPr lang="en-US" sz="1600" dirty="0"/>
-          </a:p>
-          <a:p>
-            <a:pPr marL="0" indent="0">
+              <a:rPr lang="en-US" dirty="0"/>
+              <a:t>The listed requirements reflects what has been reflected in </a:t>
+            </a:r>
+            <a:r>
+              <a:rPr lang="en-US" b="1" dirty="0"/>
+              <a:t>NEW-OPS-REQ-ITER</a:t>
+            </a:r>
+            <a:r>
+              <a:rPr lang="en-US" dirty="0"/>
+              <a:t> and </a:t>
+            </a:r>
+            <a:r>
+              <a:rPr lang="en-US" b="1" dirty="0"/>
+              <a:t>NEW-OPS-REQ-GUIDE-AND-PROFILE</a:t>
+            </a:r>
+            <a:r>
+              <a:rPr lang="en-US" dirty="0"/>
+              <a:t>.</a:t>
+            </a:r>
+          </a:p>
+          <a:p>
+            <a:pPr marR="0" lvl="0">
+              <a:lnSpc>
+                <a:spcPct val="107000"/>
+              </a:lnSpc>
               <a:spcBef>
-                <a:spcPts val="1200"/>
+                <a:spcPts val="0"/>
               </a:spcBef>
-              <a:buFont typeface="Arial" panose="020B0604020202020204" pitchFamily="34" charset="0"/>
-              <a:buNone/>
+              <a:spcAft>
+                <a:spcPts val="800"/>
+              </a:spcAft>
             </a:pPr>
             <a:r>
-              <a:rPr lang="en-US" sz="1800" b="1" dirty="0"/>
-              <a:t>YANG-Push Simplification:</a:t>
-            </a:r>
-          </a:p>
-          <a:p>
-            <a:pPr>
-              <a:spcBef>
-                <a:spcPts val="300"/>
-              </a:spcBef>
-            </a:pPr>
-            <a:r>
-              <a:rPr lang="en-US" sz="1600" dirty="0"/>
-              <a:t>YANG-Push Operational Data Observability Enhancements</a:t>
-            </a:r>
-            <a:br>
-              <a:rPr lang="en-US" sz="1600" dirty="0"/>
-            </a:br>
-            <a:r>
-              <a:rPr lang="en-US" sz="1600" dirty="0">
-                <a:hlinkClick r:id="rId11"/>
-              </a:rPr>
-              <a:t>draft-</a:t>
-            </a:r>
-            <a:r>
-              <a:rPr lang="en-US" sz="1600" dirty="0" err="1">
-                <a:hlinkClick r:id="rId11"/>
-              </a:rPr>
-              <a:t>wilton</a:t>
-            </a:r>
-            <a:r>
-              <a:rPr lang="en-US" sz="1600" dirty="0">
-                <a:hlinkClick r:id="rId11"/>
-              </a:rPr>
-              <a:t>-netconf-</a:t>
-            </a:r>
-            <a:r>
-              <a:rPr lang="en-US" sz="1600" dirty="0" err="1">
-                <a:hlinkClick r:id="rId11"/>
-              </a:rPr>
-              <a:t>yp</a:t>
-            </a:r>
-            <a:r>
-              <a:rPr lang="en-US" sz="1600" dirty="0">
-                <a:hlinkClick r:id="rId11"/>
-              </a:rPr>
-              <a:t>-observability</a:t>
-            </a:r>
-            <a:endParaRPr lang="en-US" sz="1600" dirty="0"/>
-          </a:p>
-          <a:p>
-            <a:pPr marL="0" indent="0">
-              <a:spcBef>
-                <a:spcPts val="1200"/>
-              </a:spcBef>
-              <a:buNone/>
-            </a:pPr>
-            <a:r>
-              <a:rPr lang="en-US" sz="1800" b="1" dirty="0"/>
-              <a:t>YANG-Push Message Broker:</a:t>
-            </a:r>
-          </a:p>
-          <a:p>
-            <a:pPr>
-              <a:spcBef>
-                <a:spcPts val="300"/>
-              </a:spcBef>
-            </a:pPr>
-            <a:r>
-              <a:rPr lang="en-US" sz="1600" dirty="0"/>
-              <a:t>An Architecture for YANG-Push to Message Broker Integration</a:t>
-            </a:r>
-            <a:br>
-              <a:rPr lang="en-US" sz="1600" dirty="0"/>
-            </a:br>
-            <a:r>
-              <a:rPr lang="en-US" sz="1600" dirty="0">
-                <a:hlinkClick r:id="rId12"/>
-              </a:rPr>
-              <a:t>draft-</a:t>
-            </a:r>
-            <a:r>
-              <a:rPr lang="en-US" sz="1600" dirty="0" err="1">
-                <a:hlinkClick r:id="rId12"/>
-              </a:rPr>
-              <a:t>netana</a:t>
-            </a:r>
-            <a:r>
-              <a:rPr lang="en-US" sz="1600" dirty="0">
-                <a:hlinkClick r:id="rId12"/>
-              </a:rPr>
-              <a:t>-</a:t>
-            </a:r>
-            <a:r>
-              <a:rPr lang="en-US" sz="1600" dirty="0" err="1">
-                <a:hlinkClick r:id="rId12"/>
-              </a:rPr>
-              <a:t>nmop</a:t>
-            </a:r>
-            <a:r>
-              <a:rPr lang="en-US" sz="1600" dirty="0">
-                <a:hlinkClick r:id="rId12"/>
-              </a:rPr>
-              <a:t>-yang-message-broker-integration</a:t>
-            </a:r>
-            <a:endParaRPr lang="en-US" sz="1600" dirty="0"/>
-          </a:p>
-        </p:txBody>
-      </p:sp>
-      <p:pic>
-        <p:nvPicPr>
-          <p:cNvPr id="7" name="Picture 6">
-            <a:extLst>
-              <a:ext uri="{FF2B5EF4-FFF2-40B4-BE49-F238E27FC236}">
-                <a16:creationId xmlns:a16="http://schemas.microsoft.com/office/drawing/2014/main" id="{0A11DEF8-69C9-1E60-4EF8-A3E0E2EEFE5E}"/>
-              </a:ext>
-            </a:extLst>
-          </p:cNvPr>
-          <p:cNvPicPr>
-            <a:picLocks noChangeAspect="1"/>
-          </p:cNvPicPr>
-          <p:nvPr/>
-        </p:nvPicPr>
-        <p:blipFill>
-          <a:blip r:embed="rId13"/>
-          <a:stretch>
-            <a:fillRect/>
-          </a:stretch>
-        </p:blipFill>
-        <p:spPr>
-          <a:xfrm>
-            <a:off x="838198" y="5277116"/>
-            <a:ext cx="6103778" cy="1449646"/>
-          </a:xfrm>
-          <a:prstGeom prst="rect">
-            <a:avLst/>
-          </a:prstGeom>
-        </p:spPr>
-      </p:pic>
-      <p:sp>
-        <p:nvSpPr>
-          <p:cNvPr id="9" name="TextBox 8">
-            <a:extLst>
-              <a:ext uri="{FF2B5EF4-FFF2-40B4-BE49-F238E27FC236}">
-                <a16:creationId xmlns:a16="http://schemas.microsoft.com/office/drawing/2014/main" id="{76DFCB4A-5A26-3D89-003B-C1376E910ECB}"/>
-              </a:ext>
-            </a:extLst>
-          </p:cNvPr>
-          <p:cNvSpPr txBox="1"/>
-          <p:nvPr/>
-        </p:nvSpPr>
-        <p:spPr>
-          <a:xfrm>
-            <a:off x="1751823" y="4982646"/>
-            <a:ext cx="674137" cy="369332"/>
-          </a:xfrm>
-          <a:prstGeom prst="rect">
-            <a:avLst/>
-          </a:prstGeom>
-          <a:noFill/>
-        </p:spPr>
-        <p:txBody>
-          <a:bodyPr wrap="square">
-            <a:spAutoFit/>
-          </a:bodyPr>
-          <a:lstStyle/>
-          <a:p>
-            <a:r>
-              <a:rPr lang="en-US" sz="1800" b="1" dirty="0"/>
-              <a:t>2025</a:t>
+              <a:rPr lang="en-US" dirty="0"/>
+              <a:t>The assessment described in slide 4-6 has been reflected in </a:t>
+            </a:r>
+            <a:r>
+              <a:rPr lang="en-US" b="1" dirty="0"/>
+              <a:t>NEW-OPS-REQ-REASSESS</a:t>
+            </a:r>
+            <a:r>
+              <a:rPr lang="en-US" dirty="0"/>
+              <a:t> and </a:t>
+            </a:r>
+            <a:r>
+              <a:rPr lang="en-US" b="1" dirty="0"/>
+              <a:t>NEW-OPS-REQ-INTEGRATION</a:t>
+            </a:r>
+            <a:r>
+              <a:rPr lang="en-US" dirty="0"/>
+              <a:t> has already performed </a:t>
+            </a:r>
+            <a:r>
+              <a:rPr lang="en-US"/>
+              <a:t>for IETF YANG-Push</a:t>
+            </a:r>
+            <a:r>
+              <a:rPr lang="en-US" dirty="0"/>
+              <a:t>, regrettable not at the beginning of the development, specification </a:t>
+            </a:r>
+            <a:r>
+              <a:rPr lang="en-US"/>
+              <a:t>process in 2015.</a:t>
             </a:r>
             <a:endParaRPr lang="de-CH" dirty="0"/>
           </a:p>
@@ -13190,116 +14082,56 @@
       </p:sp>
       <p:sp>
         <p:nvSpPr>
-          <p:cNvPr id="10" name="TextBox 9">
+          <p:cNvPr id="19" name="Title 1">
             <a:extLst>
               <a:ext uri="{FF2B5EF4-FFF2-40B4-BE49-F238E27FC236}">
-                <a16:creationId xmlns:a16="http://schemas.microsoft.com/office/drawing/2014/main" id="{AE56A713-7107-EBE1-2757-84C6A1F346F1}"/>
+                <a16:creationId xmlns:a16="http://schemas.microsoft.com/office/drawing/2014/main" id="{56D79134-17A9-8BC8-B7D0-97BCFFB9A6B2}"/>
               </a:ext>
             </a:extLst>
           </p:cNvPr>
-          <p:cNvSpPr txBox="1"/>
-          <p:nvPr/>
+          <p:cNvSpPr>
+            <a:spLocks noGrp="1"/>
+          </p:cNvSpPr>
+          <p:nvPr>
+            <p:ph type="title"/>
+          </p:nvPr>
         </p:nvSpPr>
         <p:spPr>
           <a:xfrm>
-            <a:off x="2746700" y="4982488"/>
-            <a:ext cx="674137" cy="369332"/>
+            <a:off x="838200" y="365125"/>
+            <a:ext cx="10879318" cy="1325563"/>
           </a:xfrm>
-          <a:prstGeom prst="rect">
-            <a:avLst/>
-          </a:prstGeom>
-          <a:noFill/>
         </p:spPr>
         <p:txBody>
-          <a:bodyPr wrap="square">
-            <a:spAutoFit/>
+          <a:bodyPr>
+            <a:normAutofit/>
           </a:bodyPr>
           <a:lstStyle/>
           <a:p>
             <a:r>
-              <a:rPr lang="en-US" sz="1800" b="1" dirty="0"/>
-              <a:t>2026</a:t>
-            </a:r>
-            <a:endParaRPr lang="de-CH" dirty="0"/>
-          </a:p>
-        </p:txBody>
-      </p:sp>
-      <p:sp>
-        <p:nvSpPr>
-          <p:cNvPr id="11" name="TextBox 10">
-            <a:extLst>
-              <a:ext uri="{FF2B5EF4-FFF2-40B4-BE49-F238E27FC236}">
-                <a16:creationId xmlns:a16="http://schemas.microsoft.com/office/drawing/2014/main" id="{97CADFF5-A2FD-EA83-3DC3-27D9F2FE3688}"/>
-              </a:ext>
-            </a:extLst>
-          </p:cNvPr>
-          <p:cNvSpPr txBox="1"/>
-          <p:nvPr/>
-        </p:nvSpPr>
-        <p:spPr>
-          <a:xfrm>
-            <a:off x="4074780" y="4982488"/>
-            <a:ext cx="674137" cy="369332"/>
-          </a:xfrm>
-          <a:prstGeom prst="rect">
-            <a:avLst/>
-          </a:prstGeom>
-          <a:noFill/>
-        </p:spPr>
-        <p:txBody>
-          <a:bodyPr wrap="square">
-            <a:spAutoFit/>
-          </a:bodyPr>
-          <a:lstStyle/>
-          <a:p>
-            <a:r>
-              <a:rPr lang="en-US" sz="1800" b="1" dirty="0"/>
-              <a:t>2027</a:t>
-            </a:r>
-            <a:endParaRPr lang="de-CH" dirty="0"/>
-          </a:p>
-        </p:txBody>
-      </p:sp>
-      <p:sp>
-        <p:nvSpPr>
-          <p:cNvPr id="12" name="TextBox 11">
-            <a:extLst>
-              <a:ext uri="{FF2B5EF4-FFF2-40B4-BE49-F238E27FC236}">
-                <a16:creationId xmlns:a16="http://schemas.microsoft.com/office/drawing/2014/main" id="{80E2C7F2-70F7-2366-8405-DD8B496C3EF7}"/>
-              </a:ext>
-            </a:extLst>
-          </p:cNvPr>
-          <p:cNvSpPr txBox="1"/>
-          <p:nvPr/>
-        </p:nvSpPr>
-        <p:spPr>
-          <a:xfrm>
-            <a:off x="5468151" y="4983827"/>
-            <a:ext cx="674137" cy="369332"/>
-          </a:xfrm>
-          <a:prstGeom prst="rect">
-            <a:avLst/>
-          </a:prstGeom>
-          <a:noFill/>
-        </p:spPr>
-        <p:txBody>
-          <a:bodyPr wrap="square">
-            <a:spAutoFit/>
-          </a:bodyPr>
-          <a:lstStyle/>
-          <a:p>
-            <a:r>
-              <a:rPr lang="en-US" sz="1800" b="1" dirty="0"/>
-              <a:t>2028</a:t>
-            </a:r>
-            <a:endParaRPr lang="de-CH" dirty="0"/>
+              <a:rPr lang="en-GB" sz="2800" b="1" dirty="0"/>
+              <a:t>Agile Incremental Driven Development</a:t>
+            </a:r>
+            <a:br>
+              <a:rPr lang="en-US" sz="3600" dirty="0"/>
+            </a:br>
+            <a:r>
+              <a:rPr lang="en-US" sz="2700" dirty="0">
+                <a:solidFill>
+                  <a:schemeClr val="bg2">
+                    <a:lumMod val="75000"/>
+                  </a:schemeClr>
+                </a:solidFill>
+              </a:rPr>
+              <a:t>IETF requirements</a:t>
+            </a:r>
           </a:p>
         </p:txBody>
       </p:sp>
     </p:spTree>
     <p:extLst>
       <p:ext uri="{BB962C8B-B14F-4D97-AF65-F5344CB8AC3E}">
-        <p14:creationId xmlns:p14="http://schemas.microsoft.com/office/powerpoint/2010/main" val="3325836654"/>
+        <p14:creationId xmlns:p14="http://schemas.microsoft.com/office/powerpoint/2010/main" val="904770719"/>
       </p:ext>
     </p:extLst>
   </p:cSld>

</xml_diff>